<commit_message>
Add interop the other way aswell
</commit_message>
<xml_diff>
--- a/F.pptx
+++ b/F.pptx
@@ -12,7 +12,8 @@
     <p:sldId id="258" r:id="rId6"/>
     <p:sldId id="261" r:id="rId7"/>
     <p:sldId id="262" r:id="rId8"/>
-    <p:sldId id="263" r:id="rId9"/>
+    <p:sldId id="264" r:id="rId9"/>
+    <p:sldId id="263" r:id="rId10"/>
   </p:sldIdLst>
   <p:sldSz cx="12192000" cy="6858000"/>
   <p:notesSz cx="6858000" cy="9144000"/>
@@ -344,7 +345,7 @@
             <a:fld id="{5586B75A-687E-405C-8A0B-8D00578BA2C3}" type="datetimeFigureOut">
               <a:rPr lang="en-US" dirty="0"/>
               <a:pPr/>
-              <a:t>2/25/2018</a:t>
+              <a:t>2/27/2018</a:t>
             </a:fld>
             <a:endParaRPr lang="en-US" dirty="0"/>
           </a:p>
@@ -511,7 +512,7 @@
             <a:fld id="{5586B75A-687E-405C-8A0B-8D00578BA2C3}" type="datetimeFigureOut">
               <a:rPr lang="en-US" dirty="0"/>
               <a:pPr/>
-              <a:t>2/25/2018</a:t>
+              <a:t>2/27/2018</a:t>
             </a:fld>
             <a:endParaRPr lang="en-US" dirty="0"/>
           </a:p>
@@ -688,7 +689,7 @@
             <a:fld id="{5586B75A-687E-405C-8A0B-8D00578BA2C3}" type="datetimeFigureOut">
               <a:rPr lang="en-US" dirty="0"/>
               <a:pPr/>
-              <a:t>2/25/2018</a:t>
+              <a:t>2/27/2018</a:t>
             </a:fld>
             <a:endParaRPr lang="en-US" dirty="0"/>
           </a:p>
@@ -855,7 +856,7 @@
             <a:fld id="{5586B75A-687E-405C-8A0B-8D00578BA2C3}" type="datetimeFigureOut">
               <a:rPr lang="en-US" dirty="0"/>
               <a:pPr/>
-              <a:t>2/25/2018</a:t>
+              <a:t>2/27/2018</a:t>
             </a:fld>
             <a:endParaRPr lang="en-US" dirty="0"/>
           </a:p>
@@ -1110,7 +1111,7 @@
             <a:fld id="{5586B75A-687E-405C-8A0B-8D00578BA2C3}" type="datetimeFigureOut">
               <a:rPr lang="en-US" dirty="0"/>
               <a:pPr/>
-              <a:t>2/25/2018</a:t>
+              <a:t>2/27/2018</a:t>
             </a:fld>
             <a:endParaRPr lang="en-US" dirty="0"/>
           </a:p>
@@ -1395,7 +1396,7 @@
             <a:fld id="{5586B75A-687E-405C-8A0B-8D00578BA2C3}" type="datetimeFigureOut">
               <a:rPr lang="en-US" dirty="0"/>
               <a:pPr/>
-              <a:t>2/25/2018</a:t>
+              <a:t>2/27/2018</a:t>
             </a:fld>
             <a:endParaRPr lang="en-US" dirty="0"/>
           </a:p>
@@ -1834,7 +1835,7 @@
             <a:fld id="{5586B75A-687E-405C-8A0B-8D00578BA2C3}" type="datetimeFigureOut">
               <a:rPr lang="en-US" dirty="0"/>
               <a:pPr/>
-              <a:t>2/25/2018</a:t>
+              <a:t>2/27/2018</a:t>
             </a:fld>
             <a:endParaRPr lang="en-US" dirty="0"/>
           </a:p>
@@ -1949,7 +1950,7 @@
             <a:fld id="{5586B75A-687E-405C-8A0B-8D00578BA2C3}" type="datetimeFigureOut">
               <a:rPr lang="en-US" dirty="0"/>
               <a:pPr/>
-              <a:t>2/25/2018</a:t>
+              <a:t>2/27/2018</a:t>
             </a:fld>
             <a:endParaRPr lang="en-US" dirty="0"/>
           </a:p>
@@ -2041,7 +2042,7 @@
             <a:fld id="{5586B75A-687E-405C-8A0B-8D00578BA2C3}" type="datetimeFigureOut">
               <a:rPr lang="en-US" dirty="0"/>
               <a:pPr/>
-              <a:t>2/25/2018</a:t>
+              <a:t>2/27/2018</a:t>
             </a:fld>
             <a:endParaRPr lang="en-US" dirty="0"/>
           </a:p>
@@ -2326,7 +2327,7 @@
             <a:fld id="{5586B75A-687E-405C-8A0B-8D00578BA2C3}" type="datetimeFigureOut">
               <a:rPr lang="en-US" dirty="0"/>
               <a:pPr/>
-              <a:t>2/25/2018</a:t>
+              <a:t>2/27/2018</a:t>
             </a:fld>
             <a:endParaRPr lang="en-US" dirty="0"/>
           </a:p>
@@ -2596,7 +2597,7 @@
             <a:fld id="{5586B75A-687E-405C-8A0B-8D00578BA2C3}" type="datetimeFigureOut">
               <a:rPr lang="en-US" dirty="0"/>
               <a:pPr/>
-              <a:t>2/25/2018</a:t>
+              <a:t>2/27/2018</a:t>
             </a:fld>
             <a:endParaRPr lang="en-US" dirty="0"/>
           </a:p>
@@ -2890,7 +2891,7 @@
             <a:fld id="{5586B75A-687E-405C-8A0B-8D00578BA2C3}" type="datetimeFigureOut">
               <a:rPr lang="en-US" dirty="0"/>
               <a:pPr/>
-              <a:t>2/25/2018</a:t>
+              <a:t>2/27/2018</a:t>
             </a:fld>
             <a:endParaRPr lang="en-US" dirty="0"/>
           </a:p>
@@ -3435,6 +3436,13 @@
   <p:clrMapOvr>
     <a:masterClrMapping/>
   </p:clrMapOvr>
+  <p:timing>
+    <p:tnLst>
+      <p:par>
+        <p:cTn id="1" dur="indefinite" restart="never" nodeType="tmRoot"/>
+      </p:par>
+    </p:tnLst>
+  </p:timing>
 </p:sld>
 </file>
 
@@ -3509,7 +3517,7 @@
           <a:p>
             <a:r>
               <a:rPr lang="fi-FI" dirty="0" smtClean="0"/>
-              <a:t>.NET yhteensopiva </a:t>
+              <a:t>.NET yhteensopiva</a:t>
             </a:r>
           </a:p>
           <a:p>
@@ -3536,6 +3544,13 @@
   <p:clrMapOvr>
     <a:masterClrMapping/>
   </p:clrMapOvr>
+  <p:timing>
+    <p:tnLst>
+      <p:par>
+        <p:cTn id="1" dur="indefinite" restart="never" nodeType="tmRoot"/>
+      </p:par>
+    </p:tnLst>
+  </p:timing>
 </p:sld>
 </file>
 
@@ -3624,11 +3639,7 @@
             </a:r>
             <a:r>
               <a:rPr lang="fi-FI" dirty="0" smtClean="0"/>
-              <a:t> 12k </a:t>
-            </a:r>
-            <a:r>
-              <a:rPr lang="fi-FI" dirty="0" smtClean="0"/>
-              <a:t>kysymystä </a:t>
+              <a:t> 12k kysymystä </a:t>
             </a:r>
           </a:p>
           <a:p>
@@ -3736,6 +3747,13 @@
   <p:clrMapOvr>
     <a:masterClrMapping/>
   </p:clrMapOvr>
+  <p:timing>
+    <p:tnLst>
+      <p:par>
+        <p:cTn id="1" dur="indefinite" restart="never" nodeType="tmRoot"/>
+      </p:par>
+    </p:tnLst>
+  </p:timing>
 </p:sld>
 </file>
 
@@ -3839,18 +3857,12 @@
               <a:rPr lang="fi-FI" dirty="0" smtClean="0"/>
               <a:t> &amp; .NET Standard</a:t>
             </a:r>
-            <a:endParaRPr lang="fi-FI" dirty="0" smtClean="0"/>
           </a:p>
           <a:p>
             <a:r>
               <a:rPr lang="fi-FI" dirty="0" smtClean="0"/>
-              <a:t>Visual </a:t>
-            </a:r>
-            <a:r>
-              <a:rPr lang="fi-FI" dirty="0" smtClean="0"/>
-              <a:t>Studio</a:t>
-            </a:r>
-            <a:endParaRPr lang="fi-FI" dirty="0" smtClean="0"/>
+              <a:t>Visual Studio</a:t>
+            </a:r>
           </a:p>
           <a:p>
             <a:endParaRPr lang="fi-FI" dirty="0"/>
@@ -3867,6 +3879,13 @@
   <p:clrMapOvr>
     <a:masterClrMapping/>
   </p:clrMapOvr>
+  <p:timing>
+    <p:tnLst>
+      <p:par>
+        <p:cTn id="1" dur="indefinite" restart="never" nodeType="tmRoot"/>
+      </p:par>
+    </p:tnLst>
+  </p:timing>
 </p:sld>
 </file>
 
@@ -3935,17 +3954,13 @@
             </a:pPr>
             <a:r>
               <a:rPr lang="fi-FI" b="1" dirty="0" smtClean="0"/>
-              <a:t>Liiketoiminta </a:t>
-            </a:r>
-            <a:r>
-              <a:rPr lang="fi-FI" b="1" dirty="0" smtClean="0"/>
-              <a:t>POV</a:t>
+              <a:t>Liiketoiminta POV</a:t>
             </a:r>
           </a:p>
           <a:p>
             <a:r>
               <a:rPr lang="fi-FI" dirty="0" smtClean="0"/>
-              <a:t>Vähemmän </a:t>
+              <a:t>Vähemmän virheitä ja </a:t>
             </a:r>
             <a:r>
               <a:rPr lang="fi-FI" dirty="0" err="1" smtClean="0"/>
@@ -3974,6 +3989,13 @@
   <p:clrMapOvr>
     <a:masterClrMapping/>
   </p:clrMapOvr>
+  <p:timing>
+    <p:tnLst>
+      <p:par>
+        <p:cTn id="1" dur="indefinite" restart="never" nodeType="tmRoot"/>
+      </p:par>
+    </p:tnLst>
+  </p:timing>
 </p:sld>
 </file>
 
@@ -4041,11 +4063,7 @@
             </a:r>
             <a:r>
               <a:rPr lang="fi-FI" b="1" dirty="0" smtClean="0"/>
-              <a:t> </a:t>
-            </a:r>
-            <a:r>
-              <a:rPr lang="fi-FI" b="1" dirty="0" smtClean="0"/>
-              <a:t>POV</a:t>
+              <a:t> POV</a:t>
             </a:r>
           </a:p>
           <a:p>
@@ -4062,6 +4080,21 @@
           </a:p>
           <a:p>
             <a:r>
+              <a:rPr lang="fi-FI" dirty="0" smtClean="0"/>
+              <a:t>C</a:t>
+            </a:r>
+            <a:r>
+              <a:rPr lang="fi-FI" dirty="0" smtClean="0"/>
+              <a:t># </a:t>
+            </a:r>
+            <a:r>
+              <a:rPr lang="fi-FI" dirty="0" err="1" smtClean="0"/>
+              <a:t>Interop</a:t>
+            </a:r>
+            <a:endParaRPr lang="fi-FI" dirty="0" smtClean="0"/>
+          </a:p>
+          <a:p>
+            <a:r>
               <a:rPr lang="fi-FI" dirty="0" err="1" smtClean="0"/>
               <a:t>Async</a:t>
             </a:r>
@@ -4081,17 +4114,6 @@
           </a:p>
           <a:p>
             <a:r>
-              <a:rPr lang="fi-FI" dirty="0" smtClean="0"/>
-              <a:t>C# </a:t>
-            </a:r>
-            <a:r>
-              <a:rPr lang="fi-FI" dirty="0" err="1" smtClean="0"/>
-              <a:t>Interop</a:t>
-            </a:r>
-            <a:endParaRPr lang="fi-FI" dirty="0" smtClean="0"/>
-          </a:p>
-          <a:p>
-            <a:r>
               <a:rPr lang="fi-FI" dirty="0" err="1" smtClean="0"/>
               <a:t>NuGet</a:t>
             </a:r>
@@ -4106,8 +4128,19 @@
           <a:p>
             <a:r>
               <a:rPr lang="fi-FI" i="1" dirty="0" smtClean="0"/>
-              <a:t>Ei aaltosulkeita ja puolipisteitä</a:t>
-            </a:r>
+              <a:t>Ei </a:t>
+            </a:r>
+            <a:r>
+              <a:rPr lang="fi-FI" i="1" dirty="0" smtClean="0"/>
+              <a:t>turhaa höttöä koodin seassa</a:t>
+            </a:r>
+            <a:r>
+              <a:rPr lang="fi-FI" i="1" dirty="0" smtClean="0">
+                <a:sym typeface="Wingdings" panose="05000000000000000000" pitchFamily="2" charset="2"/>
+              </a:rPr>
+              <a:t></a:t>
+            </a:r>
+            <a:endParaRPr lang="fi-FI" i="1" dirty="0" smtClean="0"/>
           </a:p>
           <a:p>
             <a:r>
@@ -4157,6 +4190,13 @@
   <p:clrMapOvr>
     <a:masterClrMapping/>
   </p:clrMapOvr>
+  <p:timing>
+    <p:tnLst>
+      <p:par>
+        <p:cTn id="1" dur="indefinite" restart="never" nodeType="tmRoot"/>
+      </p:par>
+    </p:tnLst>
+  </p:timing>
 </p:sld>
 </file>
 
@@ -4216,7 +4256,9 @@
         </p:nvSpPr>
         <p:spPr/>
         <p:txBody>
-          <a:bodyPr/>
+          <a:bodyPr>
+            <a:normAutofit/>
+          </a:bodyPr>
           <a:lstStyle/>
           <a:p>
             <a:pPr marL="0" indent="0">
@@ -4242,56 +4284,19 @@
           <a:p>
             <a:r>
               <a:rPr lang="fi-FI" dirty="0" smtClean="0"/>
-              <a:t>Pelko </a:t>
-            </a:r>
-          </a:p>
-          <a:p>
+              <a:t>”Se oikea projekti</a:t>
+            </a:r>
+            <a:r>
+              <a:rPr lang="fi-FI" dirty="0" smtClean="0"/>
+              <a:t>”</a:t>
+            </a:r>
+          </a:p>
+          <a:p>
+            <a:r>
+              <a:rPr lang="fi-FI" dirty="0" smtClean="0"/>
+              <a:t>Kaikki ominaisuudet ei vielä samalla tasolla kun C#</a:t>
+            </a:r>
             <a:endParaRPr lang="fi-FI" dirty="0" smtClean="0"/>
-          </a:p>
-          <a:p>
-            <a:pPr marL="0" indent="0">
-              <a:buNone/>
-            </a:pPr>
-            <a:r>
-              <a:rPr lang="fi-FI" b="1" dirty="0" smtClean="0"/>
-              <a:t>Edut</a:t>
-            </a:r>
-          </a:p>
-          <a:p>
-            <a:r>
-              <a:rPr lang="fi-FI" dirty="0" smtClean="0"/>
-              <a:t>Pieni kynnys (.NET hallussa)</a:t>
-            </a:r>
-          </a:p>
-          <a:p>
-            <a:r>
-              <a:rPr lang="fi-FI" dirty="0" smtClean="0"/>
-              <a:t>Synergioita (LINQ, SQL, useat </a:t>
-            </a:r>
-            <a:r>
-              <a:rPr lang="fi-FI" dirty="0" err="1" smtClean="0"/>
-              <a:t>Javascript</a:t>
-            </a:r>
-            <a:r>
-              <a:rPr lang="fi-FI" dirty="0" smtClean="0"/>
-              <a:t> kirjastot/mallit)</a:t>
-            </a:r>
-          </a:p>
-          <a:p>
-            <a:r>
-              <a:rPr lang="fi-FI" dirty="0" smtClean="0"/>
-              <a:t>Uusi työkalu pakkiin</a:t>
-            </a:r>
-          </a:p>
-          <a:p>
-            <a:r>
-              <a:rPr lang="fi-FI" i="1" dirty="0" err="1" smtClean="0"/>
-              <a:t>Koodarit</a:t>
-            </a:r>
-            <a:r>
-              <a:rPr lang="fi-FI" i="1" dirty="0" smtClean="0"/>
-              <a:t> tykkää uuden opettelusta</a:t>
-            </a:r>
           </a:p>
           <a:p>
             <a:endParaRPr lang="fi-FI" dirty="0" smtClean="0"/>
@@ -4314,6 +4319,13 @@
   <p:clrMapOvr>
     <a:masterClrMapping/>
   </p:clrMapOvr>
+  <p:timing>
+    <p:tnLst>
+      <p:par>
+        <p:cTn id="1" dur="indefinite" restart="never" nodeType="tmRoot"/>
+      </p:par>
+    </p:tnLst>
+  </p:timing>
 </p:sld>
 </file>
 
@@ -4351,6 +4363,180 @@
           <a:p>
             <a:r>
               <a:rPr lang="fi-FI" dirty="0" smtClean="0"/>
+              <a:t>Soveltaminen </a:t>
+            </a:r>
+            <a:r>
+              <a:rPr lang="fi-FI" dirty="0" err="1" smtClean="0"/>
+              <a:t>Eatechilla</a:t>
+            </a:r>
+            <a:endParaRPr lang="fi-FI" dirty="0"/>
+          </a:p>
+        </p:txBody>
+      </p:sp>
+      <p:sp>
+        <p:nvSpPr>
+          <p:cNvPr id="3" name="Content Placeholder 2"/>
+          <p:cNvSpPr>
+            <a:spLocks noGrp="1"/>
+          </p:cNvSpPr>
+          <p:nvPr>
+            <p:ph idx="1"/>
+          </p:nvPr>
+        </p:nvSpPr>
+        <p:spPr/>
+        <p:txBody>
+          <a:bodyPr>
+            <a:normAutofit/>
+          </a:bodyPr>
+          <a:lstStyle/>
+          <a:p>
+            <a:pPr marL="0" indent="0">
+              <a:buNone/>
+            </a:pPr>
+            <a:r>
+              <a:rPr lang="fi-FI" b="1" dirty="0"/>
+              <a:t>Edut</a:t>
+            </a:r>
+          </a:p>
+          <a:p>
+            <a:r>
+              <a:rPr lang="fi-FI" dirty="0"/>
+              <a:t>Pieni kynnys </a:t>
+            </a:r>
+          </a:p>
+          <a:p>
+            <a:pPr lvl="1"/>
+            <a:r>
+              <a:rPr lang="fi-FI" dirty="0"/>
+              <a:t>.NET</a:t>
+            </a:r>
+          </a:p>
+          <a:p>
+            <a:pPr lvl="1"/>
+            <a:r>
+              <a:rPr lang="fi-FI" dirty="0"/>
+              <a:t>LINQ</a:t>
+            </a:r>
+          </a:p>
+          <a:p>
+            <a:pPr lvl="1"/>
+            <a:r>
+              <a:rPr lang="fi-FI" dirty="0"/>
+              <a:t>SQL</a:t>
+            </a:r>
+          </a:p>
+          <a:p>
+            <a:pPr lvl="1"/>
+            <a:r>
+              <a:rPr lang="fi-FI" dirty="0" smtClean="0"/>
+              <a:t>Uudet </a:t>
+            </a:r>
+            <a:r>
+              <a:rPr lang="fi-FI" dirty="0" err="1" smtClean="0"/>
+              <a:t>Javascript</a:t>
+            </a:r>
+            <a:r>
+              <a:rPr lang="fi-FI" dirty="0" smtClean="0"/>
+              <a:t> ominaisuudet/kirjastot</a:t>
+            </a:r>
+            <a:endParaRPr lang="fi-FI" dirty="0"/>
+          </a:p>
+          <a:p>
+            <a:r>
+              <a:rPr lang="fi-FI" dirty="0"/>
+              <a:t>Uusi työkalu </a:t>
+            </a:r>
+            <a:r>
+              <a:rPr lang="fi-FI" dirty="0" smtClean="0"/>
+              <a:t>pakkiin</a:t>
+            </a:r>
+          </a:p>
+          <a:p>
+            <a:r>
+              <a:rPr lang="fi-FI" dirty="0"/>
+              <a:t>Vähemmän virheitä ja </a:t>
+            </a:r>
+            <a:r>
+              <a:rPr lang="fi-FI" dirty="0" err="1" smtClean="0"/>
+              <a:t>bugeja</a:t>
+            </a:r>
+            <a:endParaRPr lang="fi-FI" dirty="0"/>
+          </a:p>
+          <a:p>
+            <a:r>
+              <a:rPr lang="fi-FI" i="1" dirty="0" err="1"/>
+              <a:t>Koodarit</a:t>
+            </a:r>
+            <a:r>
+              <a:rPr lang="fi-FI" i="1" dirty="0"/>
+              <a:t> tykkää uuden opettelusta</a:t>
+            </a:r>
+          </a:p>
+          <a:p>
+            <a:endParaRPr lang="fi-FI" dirty="0" smtClean="0"/>
+          </a:p>
+          <a:p>
+            <a:pPr marL="0" indent="0">
+              <a:buNone/>
+            </a:pPr>
+            <a:endParaRPr lang="fi-FI" dirty="0"/>
+          </a:p>
+        </p:txBody>
+      </p:sp>
+    </p:spTree>
+    <p:extLst>
+      <p:ext uri="{BB962C8B-B14F-4D97-AF65-F5344CB8AC3E}">
+        <p14:creationId xmlns:p14="http://schemas.microsoft.com/office/powerpoint/2010/main" val="4199776996"/>
+      </p:ext>
+    </p:extLst>
+  </p:cSld>
+  <p:clrMapOvr>
+    <a:masterClrMapping/>
+  </p:clrMapOvr>
+  <p:timing>
+    <p:tnLst>
+      <p:par>
+        <p:cTn id="1" dur="indefinite" restart="never" nodeType="tmRoot"/>
+      </p:par>
+    </p:tnLst>
+  </p:timing>
+</p:sld>
+</file>
+
+<file path=ppt/slides/slide9.xml><?xml version="1.0" encoding="utf-8"?>
+<p:sld xmlns:a="http://schemas.openxmlformats.org/drawingml/2006/main" xmlns:r="http://schemas.openxmlformats.org/officeDocument/2006/relationships" xmlns:p="http://schemas.openxmlformats.org/presentationml/2006/main">
+  <p:cSld>
+    <p:spTree>
+      <p:nvGrpSpPr>
+        <p:cNvPr id="1" name=""/>
+        <p:cNvGrpSpPr/>
+        <p:nvPr/>
+      </p:nvGrpSpPr>
+      <p:grpSpPr>
+        <a:xfrm>
+          <a:off x="0" y="0"/>
+          <a:ext cx="0" cy="0"/>
+          <a:chOff x="0" y="0"/>
+          <a:chExt cx="0" cy="0"/>
+        </a:xfrm>
+      </p:grpSpPr>
+      <p:sp>
+        <p:nvSpPr>
+          <p:cNvPr id="2" name="Title 1"/>
+          <p:cNvSpPr>
+            <a:spLocks noGrp="1"/>
+          </p:cNvSpPr>
+          <p:nvPr>
+            <p:ph type="title"/>
+          </p:nvPr>
+        </p:nvSpPr>
+        <p:spPr/>
+        <p:txBody>
+          <a:bodyPr/>
+          <a:lstStyle/>
+          <a:p>
+            <a:r>
+              <a:rPr lang="fi-FI" dirty="0" smtClean="0"/>
               <a:t>Kiitos!</a:t>
             </a:r>
             <a:endParaRPr lang="fi-FI" dirty="0"/>
@@ -4406,44 +4592,30 @@
               <a:rPr lang="fi-FI" dirty="0" smtClean="0"/>
               <a:t> </a:t>
             </a:r>
-            <a:endParaRPr lang="fi-FI" dirty="0"/>
-          </a:p>
-          <a:p>
-            <a:r>
-              <a:rPr lang="fi-FI" dirty="0" err="1" smtClean="0"/>
-              <a:t>Build</a:t>
-            </a:r>
-            <a:r>
-              <a:rPr lang="fi-FI" dirty="0" smtClean="0"/>
-              <a:t> 2017: </a:t>
+          </a:p>
+          <a:p>
+            <a:r>
+              <a:rPr lang="fi-FI" dirty="0">
+                <a:hlinkClick r:id="rId3"/>
+              </a:rPr>
+              <a:t>https://fsprojects.github.io</a:t>
             </a:r>
             <a:r>
               <a:rPr lang="fi-FI" dirty="0" smtClean="0">
                 <a:hlinkClick r:id="rId3"/>
               </a:rPr>
-              <a:t>https</a:t>
-            </a:r>
-            <a:r>
-              <a:rPr lang="fi-FI" dirty="0">
-                <a:hlinkClick r:id="rId3"/>
-              </a:rPr>
-              <a:t>://</a:t>
-            </a:r>
-            <a:r>
-              <a:rPr lang="fi-FI" dirty="0" smtClean="0">
-                <a:hlinkClick r:id="rId3"/>
-              </a:rPr>
-              <a:t>channel9.msdn.com/Events/Build/2017/T6064</a:t>
-            </a:r>
-          </a:p>
-          <a:p>
-            <a:r>
-              <a:rPr lang="fi-FI" dirty="0"/>
-              <a:t>Tämä </a:t>
+              <a:t>/</a:t>
+            </a:r>
+            <a:endParaRPr lang="fi-FI" dirty="0"/>
+          </a:p>
+          <a:p>
+            <a:r>
+              <a:rPr lang="fi-FI" dirty="0" err="1" smtClean="0"/>
+              <a:t>Build</a:t>
             </a:r>
             <a:r>
               <a:rPr lang="fi-FI" dirty="0" smtClean="0"/>
-              <a:t>esitys: </a:t>
+              <a:t> 2017: </a:t>
             </a:r>
             <a:r>
               <a:rPr lang="fi-FI" dirty="0" smtClean="0">
@@ -4460,6 +4632,34 @@
             <a:r>
               <a:rPr lang="fi-FI" dirty="0" smtClean="0">
                 <a:hlinkClick r:id="rId4"/>
+              </a:rPr>
+              <a:t>channel9.msdn.com/Events/Build/2017/T6064</a:t>
+            </a:r>
+          </a:p>
+          <a:p>
+            <a:r>
+              <a:rPr lang="fi-FI" dirty="0"/>
+              <a:t>Tämä </a:t>
+            </a:r>
+            <a:r>
+              <a:rPr lang="fi-FI" dirty="0" smtClean="0"/>
+              <a:t>esitys: </a:t>
+            </a:r>
+            <a:r>
+              <a:rPr lang="fi-FI" dirty="0" smtClean="0">
+                <a:hlinkClick r:id="rId5"/>
+              </a:rPr>
+              <a:t>https</a:t>
+            </a:r>
+            <a:r>
+              <a:rPr lang="fi-FI" dirty="0">
+                <a:hlinkClick r:id="rId5"/>
+              </a:rPr>
+              <a:t>://</a:t>
+            </a:r>
+            <a:r>
+              <a:rPr lang="fi-FI" dirty="0" smtClean="0">
+                <a:hlinkClick r:id="rId5"/>
               </a:rPr>
               <a:t>github.com/supertopi/FSharpRep</a:t>
             </a:r>
@@ -4481,6 +4681,13 @@
   <p:clrMapOvr>
     <a:masterClrMapping/>
   </p:clrMapOvr>
+  <p:timing>
+    <p:tnLst>
+      <p:par>
+        <p:cTn id="1" dur="indefinite" restart="never" nodeType="tmRoot"/>
+      </p:par>
+    </p:tnLst>
+  </p:timing>
 </p:sld>
 </file>
 

</xml_diff>

<commit_message>
Updated slides and some renaming
</commit_message>
<xml_diff>
--- a/F.pptx
+++ b/F.pptx
@@ -9,11 +9,12 @@
     <p:sldId id="257" r:id="rId3"/>
     <p:sldId id="259" r:id="rId4"/>
     <p:sldId id="260" r:id="rId5"/>
-    <p:sldId id="258" r:id="rId6"/>
-    <p:sldId id="261" r:id="rId7"/>
-    <p:sldId id="262" r:id="rId8"/>
-    <p:sldId id="264" r:id="rId9"/>
-    <p:sldId id="263" r:id="rId10"/>
+    <p:sldId id="265" r:id="rId6"/>
+    <p:sldId id="258" r:id="rId7"/>
+    <p:sldId id="261" r:id="rId8"/>
+    <p:sldId id="262" r:id="rId9"/>
+    <p:sldId id="264" r:id="rId10"/>
+    <p:sldId id="263" r:id="rId11"/>
   </p:sldIdLst>
   <p:sldSz cx="12192000" cy="6858000"/>
   <p:notesSz cx="6858000" cy="9144000"/>
@@ -345,7 +346,7 @@
             <a:fld id="{5586B75A-687E-405C-8A0B-8D00578BA2C3}" type="datetimeFigureOut">
               <a:rPr lang="en-US" dirty="0"/>
               <a:pPr/>
-              <a:t>2/27/2018</a:t>
+              <a:t>2/28/2018</a:t>
             </a:fld>
             <a:endParaRPr lang="en-US" dirty="0"/>
           </a:p>
@@ -512,7 +513,7 @@
             <a:fld id="{5586B75A-687E-405C-8A0B-8D00578BA2C3}" type="datetimeFigureOut">
               <a:rPr lang="en-US" dirty="0"/>
               <a:pPr/>
-              <a:t>2/27/2018</a:t>
+              <a:t>2/28/2018</a:t>
             </a:fld>
             <a:endParaRPr lang="en-US" dirty="0"/>
           </a:p>
@@ -689,7 +690,7 @@
             <a:fld id="{5586B75A-687E-405C-8A0B-8D00578BA2C3}" type="datetimeFigureOut">
               <a:rPr lang="en-US" dirty="0"/>
               <a:pPr/>
-              <a:t>2/27/2018</a:t>
+              <a:t>2/28/2018</a:t>
             </a:fld>
             <a:endParaRPr lang="en-US" dirty="0"/>
           </a:p>
@@ -856,7 +857,7 @@
             <a:fld id="{5586B75A-687E-405C-8A0B-8D00578BA2C3}" type="datetimeFigureOut">
               <a:rPr lang="en-US" dirty="0"/>
               <a:pPr/>
-              <a:t>2/27/2018</a:t>
+              <a:t>2/28/2018</a:t>
             </a:fld>
             <a:endParaRPr lang="en-US" dirty="0"/>
           </a:p>
@@ -1111,7 +1112,7 @@
             <a:fld id="{5586B75A-687E-405C-8A0B-8D00578BA2C3}" type="datetimeFigureOut">
               <a:rPr lang="en-US" dirty="0"/>
               <a:pPr/>
-              <a:t>2/27/2018</a:t>
+              <a:t>2/28/2018</a:t>
             </a:fld>
             <a:endParaRPr lang="en-US" dirty="0"/>
           </a:p>
@@ -1396,7 +1397,7 @@
             <a:fld id="{5586B75A-687E-405C-8A0B-8D00578BA2C3}" type="datetimeFigureOut">
               <a:rPr lang="en-US" dirty="0"/>
               <a:pPr/>
-              <a:t>2/27/2018</a:t>
+              <a:t>2/28/2018</a:t>
             </a:fld>
             <a:endParaRPr lang="en-US" dirty="0"/>
           </a:p>
@@ -1835,7 +1836,7 @@
             <a:fld id="{5586B75A-687E-405C-8A0B-8D00578BA2C3}" type="datetimeFigureOut">
               <a:rPr lang="en-US" dirty="0"/>
               <a:pPr/>
-              <a:t>2/27/2018</a:t>
+              <a:t>2/28/2018</a:t>
             </a:fld>
             <a:endParaRPr lang="en-US" dirty="0"/>
           </a:p>
@@ -1950,7 +1951,7 @@
             <a:fld id="{5586B75A-687E-405C-8A0B-8D00578BA2C3}" type="datetimeFigureOut">
               <a:rPr lang="en-US" dirty="0"/>
               <a:pPr/>
-              <a:t>2/27/2018</a:t>
+              <a:t>2/28/2018</a:t>
             </a:fld>
             <a:endParaRPr lang="en-US" dirty="0"/>
           </a:p>
@@ -2042,7 +2043,7 @@
             <a:fld id="{5586B75A-687E-405C-8A0B-8D00578BA2C3}" type="datetimeFigureOut">
               <a:rPr lang="en-US" dirty="0"/>
               <a:pPr/>
-              <a:t>2/27/2018</a:t>
+              <a:t>2/28/2018</a:t>
             </a:fld>
             <a:endParaRPr lang="en-US" dirty="0"/>
           </a:p>
@@ -2327,7 +2328,7 @@
             <a:fld id="{5586B75A-687E-405C-8A0B-8D00578BA2C3}" type="datetimeFigureOut">
               <a:rPr lang="en-US" dirty="0"/>
               <a:pPr/>
-              <a:t>2/27/2018</a:t>
+              <a:t>2/28/2018</a:t>
             </a:fld>
             <a:endParaRPr lang="en-US" dirty="0"/>
           </a:p>
@@ -2597,7 +2598,7 @@
             <a:fld id="{5586B75A-687E-405C-8A0B-8D00578BA2C3}" type="datetimeFigureOut">
               <a:rPr lang="en-US" dirty="0"/>
               <a:pPr/>
-              <a:t>2/27/2018</a:t>
+              <a:t>2/28/2018</a:t>
             </a:fld>
             <a:endParaRPr lang="en-US" dirty="0"/>
           </a:p>
@@ -2891,7 +2892,7 @@
             <a:fld id="{5586B75A-687E-405C-8A0B-8D00578BA2C3}" type="datetimeFigureOut">
               <a:rPr lang="en-US" dirty="0"/>
               <a:pPr/>
-              <a:t>2/27/2018</a:t>
+              <a:t>2/28/2018</a:t>
             </a:fld>
             <a:endParaRPr lang="en-US" dirty="0"/>
           </a:p>
@@ -3446,6 +3447,194 @@
 </p:sld>
 </file>
 
+<file path=ppt/slides/slide10.xml><?xml version="1.0" encoding="utf-8"?>
+<p:sld xmlns:a="http://schemas.openxmlformats.org/drawingml/2006/main" xmlns:r="http://schemas.openxmlformats.org/officeDocument/2006/relationships" xmlns:p="http://schemas.openxmlformats.org/presentationml/2006/main">
+  <p:cSld>
+    <p:spTree>
+      <p:nvGrpSpPr>
+        <p:cNvPr id="1" name=""/>
+        <p:cNvGrpSpPr/>
+        <p:nvPr/>
+      </p:nvGrpSpPr>
+      <p:grpSpPr>
+        <a:xfrm>
+          <a:off x="0" y="0"/>
+          <a:ext cx="0" cy="0"/>
+          <a:chOff x="0" y="0"/>
+          <a:chExt cx="0" cy="0"/>
+        </a:xfrm>
+      </p:grpSpPr>
+      <p:sp>
+        <p:nvSpPr>
+          <p:cNvPr id="2" name="Title 1"/>
+          <p:cNvSpPr>
+            <a:spLocks noGrp="1"/>
+          </p:cNvSpPr>
+          <p:nvPr>
+            <p:ph type="title"/>
+          </p:nvPr>
+        </p:nvSpPr>
+        <p:spPr/>
+        <p:txBody>
+          <a:bodyPr/>
+          <a:lstStyle/>
+          <a:p>
+            <a:r>
+              <a:rPr lang="fi-FI" dirty="0" smtClean="0"/>
+              <a:t>Kiitos!</a:t>
+            </a:r>
+            <a:endParaRPr lang="fi-FI" dirty="0"/>
+          </a:p>
+        </p:txBody>
+      </p:sp>
+      <p:sp>
+        <p:nvSpPr>
+          <p:cNvPr id="3" name="Content Placeholder 2"/>
+          <p:cNvSpPr>
+            <a:spLocks noGrp="1"/>
+          </p:cNvSpPr>
+          <p:nvPr>
+            <p:ph idx="1"/>
+          </p:nvPr>
+        </p:nvSpPr>
+        <p:spPr/>
+        <p:txBody>
+          <a:bodyPr/>
+          <a:lstStyle/>
+          <a:p>
+            <a:pPr marL="0" indent="0">
+              <a:buNone/>
+            </a:pPr>
+            <a:r>
+              <a:rPr lang="fi-FI" b="1" dirty="0" smtClean="0"/>
+              <a:t>Matskua</a:t>
+            </a:r>
+            <a:endParaRPr lang="fi-FI" b="1" dirty="0" smtClean="0">
+              <a:hlinkClick r:id="rId2"/>
+            </a:endParaRPr>
+          </a:p>
+          <a:p>
+            <a:r>
+              <a:rPr lang="fi-FI" dirty="0" smtClean="0">
+                <a:hlinkClick r:id="rId2"/>
+              </a:rPr>
+              <a:t>https</a:t>
+            </a:r>
+            <a:r>
+              <a:rPr lang="fi-FI" dirty="0">
+                <a:hlinkClick r:id="rId2"/>
+              </a:rPr>
+              <a:t>://fsharpforfunandprofit.com</a:t>
+            </a:r>
+            <a:r>
+              <a:rPr lang="fi-FI" dirty="0" smtClean="0">
+                <a:hlinkClick r:id="rId2"/>
+              </a:rPr>
+              <a:t>/</a:t>
+            </a:r>
+            <a:r>
+              <a:rPr lang="fi-FI" dirty="0" smtClean="0"/>
+              <a:t> </a:t>
+            </a:r>
+          </a:p>
+          <a:p>
+            <a:r>
+              <a:rPr lang="fi-FI" dirty="0">
+                <a:hlinkClick r:id="rId3"/>
+              </a:rPr>
+              <a:t>https://fsprojects.github.io</a:t>
+            </a:r>
+            <a:r>
+              <a:rPr lang="fi-FI" dirty="0" smtClean="0">
+                <a:hlinkClick r:id="rId3"/>
+              </a:rPr>
+              <a:t>/</a:t>
+            </a:r>
+            <a:endParaRPr lang="fi-FI" dirty="0"/>
+          </a:p>
+          <a:p>
+            <a:r>
+              <a:rPr lang="fi-FI" dirty="0" err="1" smtClean="0"/>
+              <a:t>Build</a:t>
+            </a:r>
+            <a:r>
+              <a:rPr lang="fi-FI" dirty="0" smtClean="0"/>
+              <a:t> 2017: </a:t>
+            </a:r>
+            <a:r>
+              <a:rPr lang="fi-FI" dirty="0" smtClean="0">
+                <a:hlinkClick r:id="rId4"/>
+              </a:rPr>
+              <a:t>https</a:t>
+            </a:r>
+            <a:r>
+              <a:rPr lang="fi-FI" dirty="0">
+                <a:hlinkClick r:id="rId4"/>
+              </a:rPr>
+              <a:t>://</a:t>
+            </a:r>
+            <a:r>
+              <a:rPr lang="fi-FI" dirty="0" smtClean="0">
+                <a:hlinkClick r:id="rId4"/>
+              </a:rPr>
+              <a:t>channel9.msdn.com/Events/Build/2017/T6064</a:t>
+            </a:r>
+          </a:p>
+          <a:p>
+            <a:r>
+              <a:rPr lang="fi-FI" dirty="0"/>
+              <a:t>Tämä </a:t>
+            </a:r>
+            <a:r>
+              <a:rPr lang="fi-FI" dirty="0" smtClean="0"/>
+              <a:t>esitys: </a:t>
+            </a:r>
+            <a:r>
+              <a:rPr lang="fi-FI" dirty="0" smtClean="0">
+                <a:hlinkClick r:id="rId5"/>
+              </a:rPr>
+              <a:t>https</a:t>
+            </a:r>
+            <a:r>
+              <a:rPr lang="fi-FI" dirty="0">
+                <a:hlinkClick r:id="rId5"/>
+              </a:rPr>
+              <a:t>://</a:t>
+            </a:r>
+            <a:r>
+              <a:rPr lang="fi-FI" dirty="0" smtClean="0">
+                <a:hlinkClick r:id="rId5"/>
+              </a:rPr>
+              <a:t>github.com/supertopi/FSharpRep</a:t>
+            </a:r>
+            <a:endParaRPr lang="fi-FI" dirty="0" smtClean="0"/>
+          </a:p>
+          <a:p>
+            <a:pPr lvl="1"/>
+            <a:endParaRPr lang="fi-FI" dirty="0"/>
+          </a:p>
+        </p:txBody>
+      </p:sp>
+    </p:spTree>
+    <p:extLst>
+      <p:ext uri="{BB962C8B-B14F-4D97-AF65-F5344CB8AC3E}">
+        <p14:creationId xmlns:p14="http://schemas.microsoft.com/office/powerpoint/2010/main" val="1109290367"/>
+      </p:ext>
+    </p:extLst>
+  </p:cSld>
+  <p:clrMapOvr>
+    <a:masterClrMapping/>
+  </p:clrMapOvr>
+  <p:timing>
+    <p:tnLst>
+      <p:par>
+        <p:cTn id="1" dur="indefinite" restart="never" nodeType="tmRoot"/>
+      </p:par>
+    </p:tnLst>
+  </p:timing>
+</p:sld>
+</file>
+
 <file path=ppt/slides/slide2.xml><?xml version="1.0" encoding="utf-8"?>
 <p:sld xmlns:a="http://schemas.openxmlformats.org/drawingml/2006/main" xmlns:r="http://schemas.openxmlformats.org/officeDocument/2006/relationships" xmlns:p="http://schemas.openxmlformats.org/presentationml/2006/main">
   <p:cSld>
@@ -3516,15 +3705,55 @@
           </a:p>
           <a:p>
             <a:r>
-              <a:rPr lang="fi-FI" dirty="0" smtClean="0"/>
-              <a:t>.NET yhteensopiva</a:t>
-            </a:r>
-          </a:p>
-          <a:p>
-            <a:r>
-              <a:rPr lang="fi-FI" dirty="0" smtClean="0"/>
+              <a:rPr lang="fi-FI" dirty="0"/>
               <a:t>Funktionaalinen</a:t>
             </a:r>
+          </a:p>
+          <a:p>
+            <a:pPr lvl="1"/>
+            <a:r>
+              <a:rPr lang="fi-FI" dirty="0"/>
+              <a:t>Kirjoita mitä, ei </a:t>
+            </a:r>
+            <a:r>
+              <a:rPr lang="fi-FI" dirty="0" smtClean="0"/>
+              <a:t>miten</a:t>
+            </a:r>
+            <a:endParaRPr lang="fi-FI" dirty="0" smtClean="0"/>
+          </a:p>
+          <a:p>
+            <a:r>
+              <a:rPr lang="fi-FI" dirty="0" smtClean="0"/>
+              <a:t>.</a:t>
+            </a:r>
+            <a:r>
+              <a:rPr lang="fi-FI" dirty="0" smtClean="0"/>
+              <a:t>NET </a:t>
+            </a:r>
+            <a:r>
+              <a:rPr lang="fi-FI" dirty="0" smtClean="0"/>
+              <a:t>yhteensopiva</a:t>
+            </a:r>
+          </a:p>
+          <a:p>
+            <a:pPr lvl="1"/>
+            <a:r>
+              <a:rPr lang="fi-FI" dirty="0" err="1" smtClean="0"/>
+              <a:t>Ristiinkäyttö</a:t>
+            </a:r>
+            <a:r>
+              <a:rPr lang="fi-FI" dirty="0" smtClean="0"/>
+              <a:t> </a:t>
+            </a:r>
+            <a:r>
+              <a:rPr lang="fi-FI" dirty="0" err="1" smtClean="0"/>
+              <a:t>C#in</a:t>
+            </a:r>
+            <a:r>
+              <a:rPr lang="fi-FI" dirty="0" smtClean="0"/>
+              <a:t> kanssa</a:t>
+            </a:r>
+            <a:endParaRPr lang="fi-FI" dirty="0" smtClean="0"/>
           </a:p>
           <a:p>
             <a:pPr marL="0" indent="0">
@@ -3621,8 +3850,13 @@
           <a:p>
             <a:r>
               <a:rPr lang="fi-FI" dirty="0" smtClean="0"/>
-              <a:t>Ilveksessä 5 henkilöä osoittanut kiinnostusta</a:t>
-            </a:r>
+              <a:t>Ilveksessä 5 henkilöä osoittanut </a:t>
+            </a:r>
+            <a:r>
+              <a:rPr lang="fi-FI" dirty="0" smtClean="0"/>
+              <a:t>kiinnostusta </a:t>
+            </a:r>
+            <a:endParaRPr lang="fi-FI" dirty="0" smtClean="0"/>
           </a:p>
           <a:p>
             <a:r>
@@ -3861,8 +4095,21 @@
           <a:p>
             <a:r>
               <a:rPr lang="fi-FI" dirty="0" smtClean="0"/>
-              <a:t>Visual Studio</a:t>
-            </a:r>
+              <a:t>Visual </a:t>
+            </a:r>
+            <a:r>
+              <a:rPr lang="fi-FI" dirty="0" smtClean="0"/>
+              <a:t>Studio 2017, Visual Studio Mac, Visual Studio </a:t>
+            </a:r>
+            <a:r>
+              <a:rPr lang="fi-FI" dirty="0" err="1" smtClean="0"/>
+              <a:t>Code</a:t>
+            </a:r>
+            <a:r>
+              <a:rPr lang="fi-FI" dirty="0" smtClean="0"/>
+              <a:t> …</a:t>
+            </a:r>
+            <a:endParaRPr lang="fi-FI" dirty="0" smtClean="0"/>
           </a:p>
           <a:p>
             <a:endParaRPr lang="fi-FI" dirty="0"/>
@@ -3916,19 +4163,14 @@
             <p:ph type="title"/>
           </p:nvPr>
         </p:nvSpPr>
-        <p:spPr>
-          <a:xfrm>
-            <a:off x="277633" y="1123836"/>
-            <a:ext cx="2947482" cy="4601183"/>
-          </a:xfrm>
-        </p:spPr>
-        <p:txBody>
-          <a:bodyPr/>
-          <a:lstStyle/>
-          <a:p>
-            <a:r>
-              <a:rPr lang="fi-FI" dirty="0" smtClean="0"/>
-              <a:t>Miksi F#?</a:t>
+        <p:spPr/>
+        <p:txBody>
+          <a:bodyPr/>
+          <a:lstStyle/>
+          <a:p>
+            <a:r>
+              <a:rPr lang="fi-FI" dirty="0" smtClean="0"/>
+              <a:t>Ketä kiinnostaa?</a:t>
             </a:r>
             <a:endParaRPr lang="fi-FI" dirty="0"/>
           </a:p>
@@ -3952,26 +4194,16 @@
             <a:pPr marL="0" indent="0">
               <a:buNone/>
             </a:pPr>
+            <a:endParaRPr lang="fi-FI" b="1" dirty="0" smtClean="0"/>
+          </a:p>
+          <a:p>
+            <a:pPr marL="0" indent="0">
+              <a:buNone/>
+            </a:pPr>
             <a:r>
               <a:rPr lang="fi-FI" b="1" dirty="0" smtClean="0"/>
-              <a:t>Liiketoiminta POV</a:t>
-            </a:r>
-          </a:p>
-          <a:p>
-            <a:r>
-              <a:rPr lang="fi-FI" dirty="0" smtClean="0"/>
-              <a:t>Vähemmän virheitä ja </a:t>
-            </a:r>
-            <a:r>
-              <a:rPr lang="fi-FI" dirty="0" err="1" smtClean="0"/>
-              <a:t>bugeja</a:t>
-            </a:r>
-            <a:endParaRPr lang="fi-FI" dirty="0" smtClean="0"/>
-          </a:p>
-          <a:p>
-            <a:pPr marL="0" indent="0">
-              <a:buNone/>
-            </a:pPr>
+              <a:t>Kilpailijat ?</a:t>
+            </a:r>
             <a:endParaRPr lang="fi-FI" dirty="0" smtClean="0"/>
           </a:p>
           <a:p>
@@ -3982,7 +4214,7 @@
     </p:spTree>
     <p:extLst>
       <p:ext uri="{BB962C8B-B14F-4D97-AF65-F5344CB8AC3E}">
-        <p14:creationId xmlns:p14="http://schemas.microsoft.com/office/powerpoint/2010/main" val="2185046805"/>
+        <p14:creationId xmlns:p14="http://schemas.microsoft.com/office/powerpoint/2010/main" val="3170578686"/>
       </p:ext>
     </p:extLst>
   </p:cSld>
@@ -4026,7 +4258,12 @@
             <p:ph type="title"/>
           </p:nvPr>
         </p:nvSpPr>
-        <p:spPr/>
+        <p:spPr>
+          <a:xfrm>
+            <a:off x="277633" y="1123836"/>
+            <a:ext cx="2947482" cy="4601183"/>
+          </a:xfrm>
+        </p:spPr>
         <p:txBody>
           <a:bodyPr/>
           <a:lstStyle/>
@@ -4058,132 +4295,36 @@
               <a:buNone/>
             </a:pPr>
             <a:r>
-              <a:rPr lang="fi-FI" b="1" dirty="0" err="1" smtClean="0"/>
-              <a:t>Koodari</a:t>
-            </a:r>
-            <a:r>
               <a:rPr lang="fi-FI" b="1" dirty="0" smtClean="0"/>
-              <a:t> POV</a:t>
-            </a:r>
-          </a:p>
-          <a:p>
-            <a:r>
-              <a:rPr lang="fi-FI" dirty="0" smtClean="0"/>
-              <a:t>Funktiot</a:t>
-            </a:r>
-          </a:p>
-          <a:p>
-            <a:r>
-              <a:rPr lang="fi-FI" dirty="0" smtClean="0"/>
-              <a:t>Tyypit</a:t>
-            </a:r>
-          </a:p>
-          <a:p>
-            <a:r>
-              <a:rPr lang="fi-FI" dirty="0" smtClean="0"/>
-              <a:t>C</a:t>
-            </a:r>
-            <a:r>
-              <a:rPr lang="fi-FI" dirty="0" smtClean="0"/>
-              <a:t># </a:t>
+              <a:t>Liiketoiminta POV</a:t>
+            </a:r>
+          </a:p>
+          <a:p>
+            <a:r>
+              <a:rPr lang="fi-FI" dirty="0" smtClean="0"/>
+              <a:t>Vähemmän virheitä ja </a:t>
             </a:r>
             <a:r>
               <a:rPr lang="fi-FI" dirty="0" err="1" smtClean="0"/>
-              <a:t>Interop</a:t>
+              <a:t>bugeja</a:t>
             </a:r>
             <a:endParaRPr lang="fi-FI" dirty="0" smtClean="0"/>
-          </a:p>
-          <a:p>
-            <a:r>
-              <a:rPr lang="fi-FI" dirty="0" err="1" smtClean="0"/>
-              <a:t>Async</a:t>
-            </a:r>
-            <a:r>
-              <a:rPr lang="fi-FI" dirty="0" smtClean="0"/>
-              <a:t> </a:t>
-            </a:r>
-            <a:r>
-              <a:rPr lang="fi-FI" dirty="0"/>
-              <a:t>/ </a:t>
-            </a:r>
-            <a:r>
-              <a:rPr lang="fi-FI" dirty="0" err="1" smtClean="0"/>
-              <a:t>Parallel</a:t>
-            </a:r>
-            <a:endParaRPr lang="fi-FI" dirty="0" smtClean="0"/>
-          </a:p>
-          <a:p>
-            <a:r>
-              <a:rPr lang="fi-FI" dirty="0" err="1" smtClean="0"/>
-              <a:t>NuGet</a:t>
-            </a:r>
-            <a:endParaRPr lang="fi-FI" dirty="0" smtClean="0"/>
-          </a:p>
-          <a:p>
-            <a:r>
-              <a:rPr lang="fi-FI" dirty="0" smtClean="0"/>
-              <a:t>Interaktiivinen</a:t>
-            </a:r>
-          </a:p>
-          <a:p>
-            <a:r>
-              <a:rPr lang="fi-FI" i="1" dirty="0" smtClean="0"/>
-              <a:t>Ei </a:t>
-            </a:r>
-            <a:r>
-              <a:rPr lang="fi-FI" i="1" dirty="0" smtClean="0"/>
-              <a:t>turhaa höttöä koodin seassa</a:t>
-            </a:r>
-            <a:r>
-              <a:rPr lang="fi-FI" i="1" dirty="0" smtClean="0">
-                <a:sym typeface="Wingdings" panose="05000000000000000000" pitchFamily="2" charset="2"/>
-              </a:rPr>
-              <a:t></a:t>
-            </a:r>
-            <a:endParaRPr lang="fi-FI" i="1" dirty="0" smtClean="0"/>
-          </a:p>
-          <a:p>
-            <a:r>
-              <a:rPr lang="en-US" sz="1600" strike="sngStrike" dirty="0">
-                <a:latin typeface="Courier New" panose="02070309020205020404" pitchFamily="49" charset="0"/>
-                <a:cs typeface="Courier New" panose="02070309020205020404" pitchFamily="49" charset="0"/>
-              </a:rPr>
-              <a:t>Object reference not set to an instance of an </a:t>
-            </a:r>
-            <a:r>
-              <a:rPr lang="en-US" sz="1600" strike="sngStrike" dirty="0" smtClean="0">
-                <a:latin typeface="Courier New" panose="02070309020205020404" pitchFamily="49" charset="0"/>
-                <a:cs typeface="Courier New" panose="02070309020205020404" pitchFamily="49" charset="0"/>
-              </a:rPr>
-              <a:t>object</a:t>
-            </a:r>
-            <a:r>
-              <a:rPr lang="en-US" sz="1600" dirty="0" smtClean="0">
-                <a:latin typeface="Courier New" panose="02070309020205020404" pitchFamily="49" charset="0"/>
-                <a:cs typeface="Courier New" panose="02070309020205020404" pitchFamily="49" charset="0"/>
-              </a:rPr>
-              <a:t> </a:t>
-            </a:r>
-            <a:endParaRPr lang="fi-FI" strike="sngStrike" dirty="0" smtClean="0"/>
-          </a:p>
-          <a:p>
-            <a:pPr marL="0" indent="0">
-              <a:buNone/>
-            </a:pPr>
-            <a:endParaRPr lang="fi-FI" i="1" dirty="0" smtClean="0"/>
           </a:p>
           <a:p>
             <a:pPr marL="0" indent="0">
               <a:buNone/>
             </a:pPr>
             <a:endParaRPr lang="fi-FI" dirty="0" smtClean="0"/>
+          </a:p>
+          <a:p>
+            <a:endParaRPr lang="fi-FI" dirty="0"/>
           </a:p>
         </p:txBody>
       </p:sp>
     </p:spTree>
     <p:extLst>
       <p:ext uri="{BB962C8B-B14F-4D97-AF65-F5344CB8AC3E}">
-        <p14:creationId xmlns:p14="http://schemas.microsoft.com/office/powerpoint/2010/main" val="3626837686"/>
+        <p14:creationId xmlns:p14="http://schemas.microsoft.com/office/powerpoint/2010/main" val="2185046805"/>
       </p:ext>
     </p:extLst>
   </p:cSld>
@@ -4234,85 +4375,164 @@
           <a:p>
             <a:r>
               <a:rPr lang="fi-FI" dirty="0" smtClean="0"/>
-              <a:t>Soveltaminen </a:t>
+              <a:t>Miksi F#?</a:t>
+            </a:r>
+            <a:endParaRPr lang="fi-FI" dirty="0"/>
+          </a:p>
+        </p:txBody>
+      </p:sp>
+      <p:sp>
+        <p:nvSpPr>
+          <p:cNvPr id="3" name="Content Placeholder 2"/>
+          <p:cNvSpPr>
+            <a:spLocks noGrp="1"/>
+          </p:cNvSpPr>
+          <p:nvPr>
+            <p:ph idx="1"/>
+          </p:nvPr>
+        </p:nvSpPr>
+        <p:spPr/>
+        <p:txBody>
+          <a:bodyPr/>
+          <a:lstStyle/>
+          <a:p>
+            <a:pPr marL="0" indent="0">
+              <a:buNone/>
+            </a:pPr>
+            <a:r>
+              <a:rPr lang="fi-FI" b="1" dirty="0" err="1" smtClean="0"/>
+              <a:t>Koodari</a:t>
+            </a:r>
+            <a:r>
+              <a:rPr lang="fi-FI" b="1" dirty="0" smtClean="0"/>
+              <a:t> POV</a:t>
+            </a:r>
+          </a:p>
+          <a:p>
+            <a:r>
+              <a:rPr lang="fi-FI" dirty="0" smtClean="0"/>
+              <a:t>Funktiot</a:t>
+            </a:r>
+          </a:p>
+          <a:p>
+            <a:r>
+              <a:rPr lang="fi-FI" dirty="0" smtClean="0"/>
+              <a:t>Tyypit</a:t>
+            </a:r>
+          </a:p>
+          <a:p>
+            <a:r>
+              <a:rPr lang="fi-FI" dirty="0" smtClean="0"/>
+              <a:t>C# </a:t>
             </a:r>
             <a:r>
               <a:rPr lang="fi-FI" dirty="0" err="1" smtClean="0"/>
-              <a:t>Eatechilla</a:t>
-            </a:r>
-            <a:endParaRPr lang="fi-FI" dirty="0"/>
-          </a:p>
-        </p:txBody>
-      </p:sp>
-      <p:sp>
-        <p:nvSpPr>
-          <p:cNvPr id="3" name="Content Placeholder 2"/>
-          <p:cNvSpPr>
-            <a:spLocks noGrp="1"/>
-          </p:cNvSpPr>
-          <p:nvPr>
-            <p:ph idx="1"/>
-          </p:nvPr>
-        </p:nvSpPr>
-        <p:spPr/>
-        <p:txBody>
-          <a:bodyPr>
-            <a:normAutofit/>
-          </a:bodyPr>
-          <a:lstStyle/>
+              <a:t>Interop</a:t>
+            </a:r>
+            <a:endParaRPr lang="fi-FI" dirty="0" smtClean="0"/>
+          </a:p>
+          <a:p>
+            <a:r>
+              <a:rPr lang="fi-FI" dirty="0" err="1" smtClean="0"/>
+              <a:t>Async</a:t>
+            </a:r>
+            <a:r>
+              <a:rPr lang="fi-FI" dirty="0" smtClean="0"/>
+              <a:t> </a:t>
+            </a:r>
+            <a:r>
+              <a:rPr lang="fi-FI" dirty="0"/>
+              <a:t>/ </a:t>
+            </a:r>
+            <a:r>
+              <a:rPr lang="fi-FI" dirty="0" err="1" smtClean="0"/>
+              <a:t>Parallel</a:t>
+            </a:r>
+            <a:endParaRPr lang="fi-FI" dirty="0" smtClean="0"/>
+          </a:p>
+          <a:p>
+            <a:r>
+              <a:rPr lang="fi-FI" dirty="0" err="1" smtClean="0"/>
+              <a:t>NuGet</a:t>
+            </a:r>
+            <a:endParaRPr lang="fi-FI" dirty="0" smtClean="0"/>
+          </a:p>
+          <a:p>
+            <a:r>
+              <a:rPr lang="fi-FI" dirty="0" err="1" smtClean="0"/>
+              <a:t>Compiled</a:t>
+            </a:r>
+            <a:r>
+              <a:rPr lang="fi-FI" dirty="0" smtClean="0"/>
+              <a:t> tai Interactive</a:t>
+            </a:r>
+            <a:endParaRPr lang="fi-FI" dirty="0" smtClean="0"/>
+          </a:p>
+          <a:p>
+            <a:r>
+              <a:rPr lang="fi-FI" dirty="0" smtClean="0"/>
+              <a:t>Ei </a:t>
+            </a:r>
+            <a:r>
+              <a:rPr lang="fi-FI" dirty="0"/>
+              <a:t>{;} </a:t>
+            </a:r>
+            <a:r>
+              <a:rPr lang="fi-FI" dirty="0" smtClean="0"/>
+              <a:t>höttöä </a:t>
+            </a:r>
+            <a:r>
+              <a:rPr lang="fi-FI" dirty="0" smtClean="0"/>
+              <a:t>koodin </a:t>
+            </a:r>
+            <a:r>
+              <a:rPr lang="fi-FI" dirty="0" smtClean="0"/>
+              <a:t>seassa </a:t>
+            </a:r>
+            <a:endParaRPr lang="fi-FI" dirty="0" smtClean="0"/>
+          </a:p>
+          <a:p>
+            <a:r>
+              <a:rPr lang="en-US" sz="1600" strike="sngStrike" dirty="0">
+                <a:latin typeface="Courier New" panose="02070309020205020404" pitchFamily="49" charset="0"/>
+                <a:cs typeface="Courier New" panose="02070309020205020404" pitchFamily="49" charset="0"/>
+              </a:rPr>
+              <a:t>Object reference not set to an instance of an </a:t>
+            </a:r>
+            <a:r>
+              <a:rPr lang="en-US" sz="1600" strike="sngStrike" dirty="0" smtClean="0">
+                <a:latin typeface="Courier New" panose="02070309020205020404" pitchFamily="49" charset="0"/>
+                <a:cs typeface="Courier New" panose="02070309020205020404" pitchFamily="49" charset="0"/>
+              </a:rPr>
+              <a:t>object</a:t>
+            </a:r>
+            <a:r>
+              <a:rPr lang="en-US" sz="1600" dirty="0" smtClean="0">
+                <a:latin typeface="Courier New" panose="02070309020205020404" pitchFamily="49" charset="0"/>
+                <a:cs typeface="Courier New" panose="02070309020205020404" pitchFamily="49" charset="0"/>
+              </a:rPr>
+              <a:t> </a:t>
+            </a:r>
+            <a:endParaRPr lang="fi-FI" strike="sngStrike" dirty="0" smtClean="0"/>
+          </a:p>
           <a:p>
             <a:pPr marL="0" indent="0">
               <a:buNone/>
             </a:pPr>
-            <a:r>
-              <a:rPr lang="fi-FI" b="1" dirty="0" smtClean="0"/>
-              <a:t>Haasteet</a:t>
-            </a:r>
-          </a:p>
-          <a:p>
-            <a:r>
-              <a:rPr lang="fi-FI" dirty="0" smtClean="0"/>
-              <a:t>Ajattelumalli (olio-ohjelmointi vahvana)</a:t>
-            </a:r>
-          </a:p>
-          <a:p>
-            <a:r>
-              <a:rPr lang="fi-FI" dirty="0" smtClean="0"/>
-              <a:t>Koulutus</a:t>
-            </a:r>
-          </a:p>
-          <a:p>
-            <a:r>
-              <a:rPr lang="fi-FI" dirty="0" smtClean="0"/>
-              <a:t>”Se oikea projekti</a:t>
-            </a:r>
-            <a:r>
-              <a:rPr lang="fi-FI" dirty="0" smtClean="0"/>
-              <a:t>”</a:t>
-            </a:r>
-          </a:p>
-          <a:p>
-            <a:r>
-              <a:rPr lang="fi-FI" dirty="0" smtClean="0"/>
-              <a:t>Kaikki ominaisuudet ei vielä samalla tasolla kun C#</a:t>
-            </a:r>
+            <a:endParaRPr lang="fi-FI" i="1" dirty="0" smtClean="0"/>
+          </a:p>
+          <a:p>
+            <a:pPr marL="0" indent="0">
+              <a:buNone/>
+            </a:pPr>
             <a:endParaRPr lang="fi-FI" dirty="0" smtClean="0"/>
-          </a:p>
-          <a:p>
-            <a:endParaRPr lang="fi-FI" dirty="0" smtClean="0"/>
-          </a:p>
-          <a:p>
-            <a:pPr marL="0" indent="0">
-              <a:buNone/>
-            </a:pPr>
-            <a:endParaRPr lang="fi-FI" dirty="0"/>
           </a:p>
         </p:txBody>
       </p:sp>
     </p:spTree>
     <p:extLst>
       <p:ext uri="{BB962C8B-B14F-4D97-AF65-F5344CB8AC3E}">
-        <p14:creationId xmlns:p14="http://schemas.microsoft.com/office/powerpoint/2010/main" val="715962396"/>
+        <p14:creationId xmlns:p14="http://schemas.microsoft.com/office/powerpoint/2010/main" val="3626837686"/>
       </p:ext>
     </p:extLst>
   </p:cSld>
@@ -4394,85 +4614,46 @@
               <a:buNone/>
             </a:pPr>
             <a:r>
-              <a:rPr lang="fi-FI" b="1" dirty="0"/>
-              <a:t>Edut</a:t>
-            </a:r>
-          </a:p>
-          <a:p>
-            <a:r>
-              <a:rPr lang="fi-FI" dirty="0"/>
-              <a:t>Pieni kynnys </a:t>
-            </a:r>
-          </a:p>
-          <a:p>
-            <a:pPr lvl="1"/>
-            <a:r>
-              <a:rPr lang="fi-FI" dirty="0"/>
-              <a:t>.NET</a:t>
-            </a:r>
-          </a:p>
-          <a:p>
-            <a:pPr lvl="1"/>
-            <a:r>
-              <a:rPr lang="fi-FI" dirty="0"/>
-              <a:t>LINQ</a:t>
-            </a:r>
-          </a:p>
-          <a:p>
-            <a:pPr lvl="1"/>
-            <a:r>
-              <a:rPr lang="fi-FI" dirty="0"/>
-              <a:t>SQL</a:t>
-            </a:r>
-          </a:p>
-          <a:p>
-            <a:pPr lvl="1"/>
-            <a:r>
-              <a:rPr lang="fi-FI" dirty="0" smtClean="0"/>
-              <a:t>Uudet </a:t>
-            </a:r>
-            <a:r>
-              <a:rPr lang="fi-FI" dirty="0" err="1" smtClean="0"/>
-              <a:t>Javascript</a:t>
-            </a:r>
-            <a:r>
-              <a:rPr lang="fi-FI" dirty="0" smtClean="0"/>
-              <a:t> ominaisuudet/kirjastot</a:t>
-            </a:r>
-            <a:endParaRPr lang="fi-FI" dirty="0"/>
-          </a:p>
-          <a:p>
-            <a:r>
-              <a:rPr lang="fi-FI" dirty="0"/>
-              <a:t>Uusi työkalu </a:t>
-            </a:r>
-            <a:r>
-              <a:rPr lang="fi-FI" dirty="0" smtClean="0"/>
-              <a:t>pakkiin</a:t>
-            </a:r>
-          </a:p>
-          <a:p>
-            <a:r>
-              <a:rPr lang="fi-FI" dirty="0"/>
-              <a:t>Vähemmän virheitä ja </a:t>
-            </a:r>
-            <a:r>
-              <a:rPr lang="fi-FI" dirty="0" err="1" smtClean="0"/>
-              <a:t>bugeja</a:t>
-            </a:r>
-            <a:endParaRPr lang="fi-FI" dirty="0"/>
-          </a:p>
-          <a:p>
-            <a:r>
-              <a:rPr lang="fi-FI" i="1" dirty="0" err="1"/>
-              <a:t>Koodarit</a:t>
-            </a:r>
-            <a:r>
-              <a:rPr lang="fi-FI" i="1" dirty="0"/>
-              <a:t> tykkää uuden opettelusta</a:t>
-            </a:r>
-          </a:p>
-          <a:p>
+              <a:rPr lang="fi-FI" b="1" dirty="0" smtClean="0"/>
+              <a:t>Haasteet</a:t>
+            </a:r>
+          </a:p>
+          <a:p>
+            <a:r>
+              <a:rPr lang="fi-FI" dirty="0" smtClean="0"/>
+              <a:t>Ajattelumalli (olio-ohjelmointi vahvana)</a:t>
+            </a:r>
+          </a:p>
+          <a:p>
+            <a:r>
+              <a:rPr lang="fi-FI" dirty="0" smtClean="0"/>
+              <a:t>Koulutus ja käytännöt</a:t>
+            </a:r>
+            <a:endParaRPr lang="fi-FI" dirty="0" smtClean="0"/>
+          </a:p>
+          <a:p>
+            <a:r>
+              <a:rPr lang="fi-FI" dirty="0" smtClean="0"/>
+              <a:t>”Se oikea projekti”</a:t>
+            </a:r>
+          </a:p>
+          <a:p>
+            <a:r>
+              <a:rPr lang="fi-FI" dirty="0" smtClean="0"/>
+              <a:t>Kaikki ominaisuudet ei vielä samalla tasolla </a:t>
+            </a:r>
+            <a:r>
+              <a:rPr lang="fi-FI" dirty="0" smtClean="0"/>
+              <a:t>kuin </a:t>
+            </a:r>
+            <a:r>
+              <a:rPr lang="fi-FI" dirty="0" smtClean="0"/>
+              <a:t>C</a:t>
+            </a:r>
+            <a:r>
+              <a:rPr lang="fi-FI" dirty="0" smtClean="0"/>
+              <a:t>#</a:t>
+            </a:r>
             <a:endParaRPr lang="fi-FI" dirty="0" smtClean="0"/>
           </a:p>
           <a:p>
@@ -4486,7 +4667,7 @@
     </p:spTree>
     <p:extLst>
       <p:ext uri="{BB962C8B-B14F-4D97-AF65-F5344CB8AC3E}">
-        <p14:creationId xmlns:p14="http://schemas.microsoft.com/office/powerpoint/2010/main" val="4199776996"/>
+        <p14:creationId xmlns:p14="http://schemas.microsoft.com/office/powerpoint/2010/main" val="715962396"/>
       </p:ext>
     </p:extLst>
   </p:cSld>
@@ -4537,7 +4718,11 @@
           <a:p>
             <a:r>
               <a:rPr lang="fi-FI" dirty="0" smtClean="0"/>
-              <a:t>Kiitos!</a:t>
+              <a:t>Soveltaminen </a:t>
+            </a:r>
+            <a:r>
+              <a:rPr lang="fi-FI" dirty="0" err="1" smtClean="0"/>
+              <a:t>Eatechilla</a:t>
             </a:r>
             <a:endParaRPr lang="fi-FI" dirty="0"/>
           </a:p>
@@ -4555,118 +4740,100 @@
         </p:nvSpPr>
         <p:spPr/>
         <p:txBody>
-          <a:bodyPr/>
+          <a:bodyPr>
+            <a:normAutofit/>
+          </a:bodyPr>
           <a:lstStyle/>
           <a:p>
             <a:pPr marL="0" indent="0">
               <a:buNone/>
             </a:pPr>
             <a:r>
-              <a:rPr lang="fi-FI" b="1" dirty="0" smtClean="0"/>
-              <a:t>Matskua</a:t>
-            </a:r>
-            <a:endParaRPr lang="fi-FI" b="1" dirty="0" smtClean="0">
-              <a:hlinkClick r:id="rId2"/>
-            </a:endParaRPr>
-          </a:p>
-          <a:p>
-            <a:r>
-              <a:rPr lang="fi-FI" dirty="0" smtClean="0">
-                <a:hlinkClick r:id="rId2"/>
-              </a:rPr>
-              <a:t>https</a:t>
-            </a:r>
-            <a:r>
-              <a:rPr lang="fi-FI" dirty="0">
-                <a:hlinkClick r:id="rId2"/>
-              </a:rPr>
-              <a:t>://fsharpforfunandprofit.com</a:t>
-            </a:r>
-            <a:r>
-              <a:rPr lang="fi-FI" dirty="0" smtClean="0">
-                <a:hlinkClick r:id="rId2"/>
-              </a:rPr>
-              <a:t>/</a:t>
-            </a:r>
-            <a:r>
-              <a:rPr lang="fi-FI" dirty="0" smtClean="0"/>
-              <a:t> </a:t>
-            </a:r>
-          </a:p>
-          <a:p>
-            <a:r>
-              <a:rPr lang="fi-FI" dirty="0">
-                <a:hlinkClick r:id="rId3"/>
-              </a:rPr>
-              <a:t>https://fsprojects.github.io</a:t>
-            </a:r>
-            <a:r>
-              <a:rPr lang="fi-FI" dirty="0" smtClean="0">
-                <a:hlinkClick r:id="rId3"/>
-              </a:rPr>
-              <a:t>/</a:t>
+              <a:rPr lang="fi-FI" b="1" dirty="0"/>
+              <a:t>Edut</a:t>
+            </a:r>
+          </a:p>
+          <a:p>
+            <a:r>
+              <a:rPr lang="fi-FI" dirty="0"/>
+              <a:t>Pieni kynnys </a:t>
+            </a:r>
+          </a:p>
+          <a:p>
+            <a:pPr lvl="1"/>
+            <a:r>
+              <a:rPr lang="fi-FI" dirty="0"/>
+              <a:t>.NET</a:t>
+            </a:r>
+          </a:p>
+          <a:p>
+            <a:pPr lvl="1"/>
+            <a:r>
+              <a:rPr lang="fi-FI" dirty="0"/>
+              <a:t>LINQ</a:t>
+            </a:r>
+          </a:p>
+          <a:p>
+            <a:pPr lvl="1"/>
+            <a:r>
+              <a:rPr lang="fi-FI" dirty="0"/>
+              <a:t>SQL</a:t>
+            </a:r>
+          </a:p>
+          <a:p>
+            <a:pPr lvl="1"/>
+            <a:r>
+              <a:rPr lang="fi-FI" dirty="0" smtClean="0"/>
+              <a:t>Uudet </a:t>
+            </a:r>
+            <a:r>
+              <a:rPr lang="fi-FI" dirty="0" err="1" smtClean="0"/>
+              <a:t>Javascript</a:t>
+            </a:r>
+            <a:r>
+              <a:rPr lang="fi-FI" dirty="0" smtClean="0"/>
+              <a:t> ominaisuudet/kirjastot</a:t>
             </a:r>
             <a:endParaRPr lang="fi-FI" dirty="0"/>
           </a:p>
           <a:p>
             <a:r>
+              <a:rPr lang="fi-FI" dirty="0"/>
+              <a:t>Uusi työkalu </a:t>
+            </a:r>
+            <a:r>
+              <a:rPr lang="fi-FI" dirty="0" smtClean="0"/>
+              <a:t>pakkiin</a:t>
+            </a:r>
+          </a:p>
+          <a:p>
+            <a:r>
+              <a:rPr lang="fi-FI" dirty="0"/>
+              <a:t>Vähemmän virheitä ja </a:t>
+            </a:r>
+            <a:r>
               <a:rPr lang="fi-FI" dirty="0" err="1" smtClean="0"/>
-              <a:t>Build</a:t>
-            </a:r>
-            <a:r>
-              <a:rPr lang="fi-FI" dirty="0" smtClean="0"/>
-              <a:t> 2017: </a:t>
-            </a:r>
-            <a:r>
-              <a:rPr lang="fi-FI" dirty="0" smtClean="0">
-                <a:hlinkClick r:id="rId4"/>
-              </a:rPr>
-              <a:t>https</a:t>
-            </a:r>
-            <a:r>
-              <a:rPr lang="fi-FI" dirty="0">
-                <a:hlinkClick r:id="rId4"/>
-              </a:rPr>
-              <a:t>://</a:t>
-            </a:r>
-            <a:r>
-              <a:rPr lang="fi-FI" dirty="0" smtClean="0">
-                <a:hlinkClick r:id="rId4"/>
-              </a:rPr>
-              <a:t>channel9.msdn.com/Events/Build/2017/T6064</a:t>
-            </a:r>
-          </a:p>
-          <a:p>
-            <a:r>
-              <a:rPr lang="fi-FI" dirty="0"/>
-              <a:t>Tämä </a:t>
-            </a:r>
-            <a:r>
-              <a:rPr lang="fi-FI" dirty="0" smtClean="0"/>
-              <a:t>esitys: </a:t>
-            </a:r>
-            <a:r>
-              <a:rPr lang="fi-FI" dirty="0" smtClean="0">
-                <a:hlinkClick r:id="rId5"/>
-              </a:rPr>
-              <a:t>https</a:t>
-            </a:r>
-            <a:r>
-              <a:rPr lang="fi-FI" dirty="0">
-                <a:hlinkClick r:id="rId5"/>
-              </a:rPr>
-              <a:t>://</a:t>
-            </a:r>
-            <a:r>
-              <a:rPr lang="fi-FI" dirty="0" smtClean="0">
-                <a:hlinkClick r:id="rId5"/>
-              </a:rPr>
-              <a:t>github.com/supertopi/FSharpRep</a:t>
-            </a:r>
+              <a:t>bugeja</a:t>
+            </a:r>
+            <a:endParaRPr lang="fi-FI" dirty="0"/>
+          </a:p>
+          <a:p>
+            <a:r>
+              <a:rPr lang="fi-FI" i="1" dirty="0" err="1"/>
+              <a:t>Koodarit</a:t>
+            </a:r>
+            <a:r>
+              <a:rPr lang="fi-FI" i="1" dirty="0"/>
+              <a:t> tykkää uuden opettelusta</a:t>
+            </a:r>
+          </a:p>
+          <a:p>
             <a:endParaRPr lang="fi-FI" dirty="0" smtClean="0"/>
           </a:p>
           <a:p>
-            <a:pPr lvl="1"/>
+            <a:pPr marL="0" indent="0">
+              <a:buNone/>
+            </a:pPr>
             <a:endParaRPr lang="fi-FI" dirty="0"/>
           </a:p>
         </p:txBody>
@@ -4674,7 +4841,7 @@
     </p:spTree>
     <p:extLst>
       <p:ext uri="{BB962C8B-B14F-4D97-AF65-F5344CB8AC3E}">
-        <p14:creationId xmlns:p14="http://schemas.microsoft.com/office/powerpoint/2010/main" val="1109290367"/>
+        <p14:creationId xmlns:p14="http://schemas.microsoft.com/office/powerpoint/2010/main" val="4199776996"/>
       </p:ext>
     </p:extLst>
   </p:cSld>

</xml_diff>

<commit_message>
Type example and Non-static class example
</commit_message>
<xml_diff>
--- a/F.pptx
+++ b/F.pptx
@@ -10,8 +10,8 @@
     <p:sldId id="259" r:id="rId4"/>
     <p:sldId id="260" r:id="rId5"/>
     <p:sldId id="265" r:id="rId6"/>
-    <p:sldId id="258" r:id="rId7"/>
-    <p:sldId id="261" r:id="rId8"/>
+    <p:sldId id="261" r:id="rId7"/>
+    <p:sldId id="258" r:id="rId8"/>
     <p:sldId id="262" r:id="rId9"/>
     <p:sldId id="264" r:id="rId10"/>
     <p:sldId id="263" r:id="rId11"/>
@@ -346,7 +346,7 @@
             <a:fld id="{5586B75A-687E-405C-8A0B-8D00578BA2C3}" type="datetimeFigureOut">
               <a:rPr lang="en-US" dirty="0"/>
               <a:pPr/>
-              <a:t>2/28/2018</a:t>
+              <a:t>3/5/2018</a:t>
             </a:fld>
             <a:endParaRPr lang="en-US" dirty="0"/>
           </a:p>
@@ -513,7 +513,7 @@
             <a:fld id="{5586B75A-687E-405C-8A0B-8D00578BA2C3}" type="datetimeFigureOut">
               <a:rPr lang="en-US" dirty="0"/>
               <a:pPr/>
-              <a:t>2/28/2018</a:t>
+              <a:t>3/5/2018</a:t>
             </a:fld>
             <a:endParaRPr lang="en-US" dirty="0"/>
           </a:p>
@@ -690,7 +690,7 @@
             <a:fld id="{5586B75A-687E-405C-8A0B-8D00578BA2C3}" type="datetimeFigureOut">
               <a:rPr lang="en-US" dirty="0"/>
               <a:pPr/>
-              <a:t>2/28/2018</a:t>
+              <a:t>3/5/2018</a:t>
             </a:fld>
             <a:endParaRPr lang="en-US" dirty="0"/>
           </a:p>
@@ -857,7 +857,7 @@
             <a:fld id="{5586B75A-687E-405C-8A0B-8D00578BA2C3}" type="datetimeFigureOut">
               <a:rPr lang="en-US" dirty="0"/>
               <a:pPr/>
-              <a:t>2/28/2018</a:t>
+              <a:t>3/5/2018</a:t>
             </a:fld>
             <a:endParaRPr lang="en-US" dirty="0"/>
           </a:p>
@@ -1112,7 +1112,7 @@
             <a:fld id="{5586B75A-687E-405C-8A0B-8D00578BA2C3}" type="datetimeFigureOut">
               <a:rPr lang="en-US" dirty="0"/>
               <a:pPr/>
-              <a:t>2/28/2018</a:t>
+              <a:t>3/5/2018</a:t>
             </a:fld>
             <a:endParaRPr lang="en-US" dirty="0"/>
           </a:p>
@@ -1397,7 +1397,7 @@
             <a:fld id="{5586B75A-687E-405C-8A0B-8D00578BA2C3}" type="datetimeFigureOut">
               <a:rPr lang="en-US" dirty="0"/>
               <a:pPr/>
-              <a:t>2/28/2018</a:t>
+              <a:t>3/5/2018</a:t>
             </a:fld>
             <a:endParaRPr lang="en-US" dirty="0"/>
           </a:p>
@@ -1836,7 +1836,7 @@
             <a:fld id="{5586B75A-687E-405C-8A0B-8D00578BA2C3}" type="datetimeFigureOut">
               <a:rPr lang="en-US" dirty="0"/>
               <a:pPr/>
-              <a:t>2/28/2018</a:t>
+              <a:t>3/5/2018</a:t>
             </a:fld>
             <a:endParaRPr lang="en-US" dirty="0"/>
           </a:p>
@@ -1951,7 +1951,7 @@
             <a:fld id="{5586B75A-687E-405C-8A0B-8D00578BA2C3}" type="datetimeFigureOut">
               <a:rPr lang="en-US" dirty="0"/>
               <a:pPr/>
-              <a:t>2/28/2018</a:t>
+              <a:t>3/5/2018</a:t>
             </a:fld>
             <a:endParaRPr lang="en-US" dirty="0"/>
           </a:p>
@@ -2043,7 +2043,7 @@
             <a:fld id="{5586B75A-687E-405C-8A0B-8D00578BA2C3}" type="datetimeFigureOut">
               <a:rPr lang="en-US" dirty="0"/>
               <a:pPr/>
-              <a:t>2/28/2018</a:t>
+              <a:t>3/5/2018</a:t>
             </a:fld>
             <a:endParaRPr lang="en-US" dirty="0"/>
           </a:p>
@@ -2328,7 +2328,7 @@
             <a:fld id="{5586B75A-687E-405C-8A0B-8D00578BA2C3}" type="datetimeFigureOut">
               <a:rPr lang="en-US" dirty="0"/>
               <a:pPr/>
-              <a:t>2/28/2018</a:t>
+              <a:t>3/5/2018</a:t>
             </a:fld>
             <a:endParaRPr lang="en-US" dirty="0"/>
           </a:p>
@@ -2598,7 +2598,7 @@
             <a:fld id="{5586B75A-687E-405C-8A0B-8D00578BA2C3}" type="datetimeFigureOut">
               <a:rPr lang="en-US" dirty="0"/>
               <a:pPr/>
-              <a:t>2/28/2018</a:t>
+              <a:t>3/5/2018</a:t>
             </a:fld>
             <a:endParaRPr lang="en-US" dirty="0"/>
           </a:p>
@@ -2892,7 +2892,7 @@
             <a:fld id="{5586B75A-687E-405C-8A0B-8D00578BA2C3}" type="datetimeFigureOut">
               <a:rPr lang="en-US" dirty="0"/>
               <a:pPr/>
-              <a:t>2/28/2018</a:t>
+              <a:t>3/5/2018</a:t>
             </a:fld>
             <a:endParaRPr lang="en-US" dirty="0"/>
           </a:p>
@@ -3719,21 +3719,20 @@
               <a:rPr lang="fi-FI" dirty="0" smtClean="0"/>
               <a:t>miten</a:t>
             </a:r>
+          </a:p>
+          <a:p>
+            <a:r>
+              <a:rPr lang="fi-FI" dirty="0" smtClean="0"/>
+              <a:t>.NET yhteensopiva</a:t>
+            </a:r>
+          </a:p>
+          <a:p>
+            <a:pPr lvl="1"/>
+            <a:r>
+              <a:rPr lang="fi-FI" dirty="0" smtClean="0"/>
+              <a:t>Tutut ympäristöt ja kirjastot</a:t>
+            </a:r>
             <a:endParaRPr lang="fi-FI" dirty="0" smtClean="0"/>
-          </a:p>
-          <a:p>
-            <a:r>
-              <a:rPr lang="fi-FI" dirty="0" smtClean="0"/>
-              <a:t>.</a:t>
-            </a:r>
-            <a:r>
-              <a:rPr lang="fi-FI" dirty="0" smtClean="0"/>
-              <a:t>NET </a:t>
-            </a:r>
-            <a:r>
-              <a:rPr lang="fi-FI" dirty="0" smtClean="0"/>
-              <a:t>yhteensopiva</a:t>
-            </a:r>
           </a:p>
           <a:p>
             <a:pPr lvl="1"/>
@@ -3753,7 +3752,6 @@
               <a:rPr lang="fi-FI" dirty="0" smtClean="0"/>
               <a:t> kanssa</a:t>
             </a:r>
-            <a:endParaRPr lang="fi-FI" dirty="0" smtClean="0"/>
           </a:p>
           <a:p>
             <a:pPr marL="0" indent="0">
@@ -3850,13 +3848,8 @@
           <a:p>
             <a:r>
               <a:rPr lang="fi-FI" dirty="0" smtClean="0"/>
-              <a:t>Ilveksessä 5 henkilöä osoittanut </a:t>
-            </a:r>
-            <a:r>
-              <a:rPr lang="fi-FI" dirty="0" smtClean="0"/>
-              <a:t>kiinnostusta </a:t>
-            </a:r>
-            <a:endParaRPr lang="fi-FI" dirty="0" smtClean="0"/>
+              <a:t>Ilveksessä 5 henkilöä osoittanut kiinnostusta </a:t>
+            </a:r>
           </a:p>
           <a:p>
             <a:r>
@@ -4095,11 +4088,7 @@
           <a:p>
             <a:r>
               <a:rPr lang="fi-FI" dirty="0" smtClean="0"/>
-              <a:t>Visual </a:t>
-            </a:r>
-            <a:r>
-              <a:rPr lang="fi-FI" dirty="0" smtClean="0"/>
-              <a:t>Studio 2017, Visual Studio Mac, Visual Studio </a:t>
+              <a:t>Visual Studio 2017, Visual Studio Mac, Visual Studio </a:t>
             </a:r>
             <a:r>
               <a:rPr lang="fi-FI" dirty="0" err="1" smtClean="0"/>
@@ -4109,7 +4098,6 @@
               <a:rPr lang="fi-FI" dirty="0" smtClean="0"/>
               <a:t> …</a:t>
             </a:r>
-            <a:endParaRPr lang="fi-FI" dirty="0" smtClean="0"/>
           </a:p>
           <a:p>
             <a:endParaRPr lang="fi-FI" dirty="0"/>
@@ -4258,12 +4246,7 @@
             <p:ph type="title"/>
           </p:nvPr>
         </p:nvSpPr>
-        <p:spPr>
-          <a:xfrm>
-            <a:off x="277633" y="1123836"/>
-            <a:ext cx="2947482" cy="4601183"/>
-          </a:xfrm>
-        </p:spPr>
+        <p:spPr/>
         <p:txBody>
           <a:bodyPr/>
           <a:lstStyle/>
@@ -4295,36 +4278,129 @@
               <a:buNone/>
             </a:pPr>
             <a:r>
+              <a:rPr lang="fi-FI" b="1" dirty="0" err="1" smtClean="0"/>
+              <a:t>Koodari</a:t>
+            </a:r>
+            <a:r>
               <a:rPr lang="fi-FI" b="1" dirty="0" smtClean="0"/>
-              <a:t>Liiketoiminta POV</a:t>
-            </a:r>
-          </a:p>
-          <a:p>
-            <a:r>
-              <a:rPr lang="fi-FI" dirty="0" smtClean="0"/>
-              <a:t>Vähemmän virheitä ja </a:t>
+              <a:t> POV</a:t>
+            </a:r>
+          </a:p>
+          <a:p>
+            <a:r>
+              <a:rPr lang="fi-FI" dirty="0" smtClean="0"/>
+              <a:t>Funktiot</a:t>
+            </a:r>
+          </a:p>
+          <a:p>
+            <a:r>
+              <a:rPr lang="fi-FI" dirty="0" smtClean="0"/>
+              <a:t>Tyypit</a:t>
+            </a:r>
+          </a:p>
+          <a:p>
+            <a:r>
+              <a:rPr lang="fi-FI" dirty="0" smtClean="0"/>
+              <a:t>C# </a:t>
             </a:r>
             <a:r>
               <a:rPr lang="fi-FI" dirty="0" err="1" smtClean="0"/>
-              <a:t>bugeja</a:t>
+              <a:t>Interop</a:t>
             </a:r>
             <a:endParaRPr lang="fi-FI" dirty="0" smtClean="0"/>
+          </a:p>
+          <a:p>
+            <a:r>
+              <a:rPr lang="fi-FI" dirty="0" err="1" smtClean="0"/>
+              <a:t>Async</a:t>
+            </a:r>
+            <a:r>
+              <a:rPr lang="fi-FI" dirty="0" smtClean="0"/>
+              <a:t> </a:t>
+            </a:r>
+            <a:r>
+              <a:rPr lang="fi-FI" dirty="0"/>
+              <a:t>/ </a:t>
+            </a:r>
+            <a:r>
+              <a:rPr lang="fi-FI" dirty="0" err="1" smtClean="0"/>
+              <a:t>Parallel</a:t>
+            </a:r>
+            <a:endParaRPr lang="fi-FI" dirty="0" smtClean="0"/>
+          </a:p>
+          <a:p>
+            <a:r>
+              <a:rPr lang="fi-FI" dirty="0" err="1" smtClean="0"/>
+              <a:t>NuGet</a:t>
+            </a:r>
+            <a:endParaRPr lang="fi-FI" dirty="0" smtClean="0"/>
+          </a:p>
+          <a:p>
+            <a:r>
+              <a:rPr lang="fi-FI" dirty="0" err="1" smtClean="0"/>
+              <a:t>Compiled</a:t>
+            </a:r>
+            <a:r>
+              <a:rPr lang="fi-FI" dirty="0" smtClean="0"/>
+              <a:t> tai Interactive</a:t>
+            </a:r>
+          </a:p>
+          <a:p>
+            <a:r>
+              <a:rPr lang="fi-FI" dirty="0" smtClean="0"/>
+              <a:t>Ei </a:t>
+            </a:r>
+            <a:r>
+              <a:rPr lang="fi-FI" dirty="0"/>
+              <a:t>{;} </a:t>
+            </a:r>
+            <a:r>
+              <a:rPr lang="fi-FI" dirty="0" smtClean="0"/>
+              <a:t>höttöä koodin seassa </a:t>
+            </a:r>
+          </a:p>
+          <a:p>
+            <a:r>
+              <a:rPr lang="en-US" sz="1600" strike="sngStrike" dirty="0">
+                <a:latin typeface="Courier New" panose="02070309020205020404" pitchFamily="49" charset="0"/>
+                <a:cs typeface="Courier New" panose="02070309020205020404" pitchFamily="49" charset="0"/>
+              </a:rPr>
+              <a:t>Object reference not set to an instance of an </a:t>
+            </a:r>
+            <a:r>
+              <a:rPr lang="en-US" sz="1600" strike="sngStrike" dirty="0" smtClean="0">
+                <a:latin typeface="Courier New" panose="02070309020205020404" pitchFamily="49" charset="0"/>
+                <a:cs typeface="Courier New" panose="02070309020205020404" pitchFamily="49" charset="0"/>
+              </a:rPr>
+              <a:t>object</a:t>
+            </a:r>
+            <a:r>
+              <a:rPr lang="en-US" sz="1600" dirty="0" smtClean="0">
+                <a:latin typeface="Courier New" panose="02070309020205020404" pitchFamily="49" charset="0"/>
+                <a:cs typeface="Courier New" panose="02070309020205020404" pitchFamily="49" charset="0"/>
+              </a:rPr>
+              <a:t> </a:t>
+            </a:r>
+            <a:endParaRPr lang="fi-FI" strike="sngStrike" dirty="0" smtClean="0"/>
+          </a:p>
+          <a:p>
+            <a:pPr marL="0" indent="0">
+              <a:buNone/>
+            </a:pPr>
+            <a:endParaRPr lang="fi-FI" i="1" dirty="0" smtClean="0"/>
           </a:p>
           <a:p>
             <a:pPr marL="0" indent="0">
               <a:buNone/>
             </a:pPr>
             <a:endParaRPr lang="fi-FI" dirty="0" smtClean="0"/>
-          </a:p>
-          <a:p>
-            <a:endParaRPr lang="fi-FI" dirty="0"/>
           </a:p>
         </p:txBody>
       </p:sp>
     </p:spTree>
     <p:extLst>
       <p:ext uri="{BB962C8B-B14F-4D97-AF65-F5344CB8AC3E}">
-        <p14:creationId xmlns:p14="http://schemas.microsoft.com/office/powerpoint/2010/main" val="2185046805"/>
+        <p14:creationId xmlns:p14="http://schemas.microsoft.com/office/powerpoint/2010/main" val="3626837686"/>
       </p:ext>
     </p:extLst>
   </p:cSld>
@@ -4368,7 +4444,12 @@
             <p:ph type="title"/>
           </p:nvPr>
         </p:nvSpPr>
-        <p:spPr/>
+        <p:spPr>
+          <a:xfrm>
+            <a:off x="277633" y="1123836"/>
+            <a:ext cx="2947482" cy="4601183"/>
+          </a:xfrm>
+        </p:spPr>
         <p:txBody>
           <a:bodyPr/>
           <a:lstStyle/>
@@ -4399,140 +4480,94 @@
             <a:pPr marL="0" indent="0">
               <a:buNone/>
             </a:pPr>
-            <a:r>
-              <a:rPr lang="fi-FI" b="1" dirty="0" err="1" smtClean="0"/>
-              <a:t>Koodari</a:t>
-            </a:r>
+            <a:endParaRPr lang="fi-FI" b="1" dirty="0" smtClean="0"/>
+          </a:p>
+          <a:p>
+            <a:pPr marL="0" indent="0">
+              <a:buNone/>
+            </a:pPr>
+            <a:endParaRPr lang="fi-FI" b="1" dirty="0"/>
+          </a:p>
+          <a:p>
+            <a:pPr marL="0" indent="0">
+              <a:buNone/>
+            </a:pPr>
+            <a:endParaRPr lang="fi-FI" b="1" dirty="0" smtClean="0"/>
+          </a:p>
+          <a:p>
+            <a:pPr marL="0" indent="0">
+              <a:buNone/>
+            </a:pPr>
             <a:r>
               <a:rPr lang="fi-FI" b="1" dirty="0" smtClean="0"/>
-              <a:t> POV</a:t>
-            </a:r>
-          </a:p>
-          <a:p>
-            <a:r>
-              <a:rPr lang="fi-FI" dirty="0" smtClean="0"/>
-              <a:t>Funktiot</a:t>
-            </a:r>
-          </a:p>
-          <a:p>
-            <a:r>
-              <a:rPr lang="fi-FI" dirty="0" smtClean="0"/>
-              <a:t>Tyypit</a:t>
-            </a:r>
-          </a:p>
-          <a:p>
-            <a:r>
-              <a:rPr lang="fi-FI" dirty="0" smtClean="0"/>
-              <a:t>C# </a:t>
+              <a:t>Liiketoiminta POV</a:t>
+            </a:r>
+          </a:p>
+          <a:p>
+            <a:r>
+              <a:rPr lang="fi-FI" dirty="0" smtClean="0"/>
+              <a:t>Voi vähentää </a:t>
+            </a:r>
+            <a:r>
+              <a:rPr lang="fi-FI" dirty="0" smtClean="0"/>
+              <a:t>virheitä ja </a:t>
             </a:r>
             <a:r>
               <a:rPr lang="fi-FI" dirty="0" err="1" smtClean="0"/>
-              <a:t>Interop</a:t>
+              <a:t>bugeja</a:t>
+            </a:r>
+            <a:r>
+              <a:rPr lang="fi-FI" dirty="0" smtClean="0"/>
+              <a:t> </a:t>
+            </a:r>
+            <a:r>
+              <a:rPr lang="fi-FI" dirty="0" smtClean="0"/>
+              <a:t>jotka pääsevät releaseen</a:t>
             </a:r>
             <a:endParaRPr lang="fi-FI" dirty="0" smtClean="0"/>
           </a:p>
           <a:p>
             <a:r>
-              <a:rPr lang="fi-FI" dirty="0" err="1" smtClean="0"/>
-              <a:t>Async</a:t>
-            </a:r>
-            <a:r>
-              <a:rPr lang="fi-FI" dirty="0" smtClean="0"/>
-              <a:t> </a:t>
-            </a:r>
-            <a:r>
-              <a:rPr lang="fi-FI" dirty="0"/>
-              <a:t>/ </a:t>
-            </a:r>
-            <a:r>
-              <a:rPr lang="fi-FI" dirty="0" err="1" smtClean="0"/>
-              <a:t>Parallel</a:t>
+              <a:rPr lang="fi-FI" dirty="0" smtClean="0"/>
+              <a:t>Voi parantaa </a:t>
+            </a:r>
+            <a:r>
+              <a:rPr lang="fi-FI" dirty="0" smtClean="0"/>
+              <a:t>tuottavuutta</a:t>
             </a:r>
             <a:endParaRPr lang="fi-FI" dirty="0" smtClean="0"/>
-          </a:p>
-          <a:p>
-            <a:r>
-              <a:rPr lang="fi-FI" dirty="0" err="1" smtClean="0"/>
-              <a:t>NuGet</a:t>
-            </a:r>
-            <a:endParaRPr lang="fi-FI" dirty="0" smtClean="0"/>
-          </a:p>
-          <a:p>
-            <a:r>
-              <a:rPr lang="fi-FI" dirty="0" err="1" smtClean="0"/>
-              <a:t>Compiled</a:t>
-            </a:r>
-            <a:r>
-              <a:rPr lang="fi-FI" dirty="0" smtClean="0"/>
-              <a:t> tai Interactive</a:t>
-            </a:r>
-            <a:endParaRPr lang="fi-FI" dirty="0" smtClean="0"/>
-          </a:p>
-          <a:p>
-            <a:r>
-              <a:rPr lang="fi-FI" dirty="0" smtClean="0"/>
-              <a:t>Ei </a:t>
-            </a:r>
-            <a:r>
-              <a:rPr lang="fi-FI" dirty="0"/>
-              <a:t>{;} </a:t>
-            </a:r>
-            <a:r>
-              <a:rPr lang="fi-FI" dirty="0" smtClean="0"/>
-              <a:t>höttöä </a:t>
-            </a:r>
-            <a:r>
-              <a:rPr lang="fi-FI" dirty="0" smtClean="0"/>
-              <a:t>koodin </a:t>
-            </a:r>
-            <a:r>
-              <a:rPr lang="fi-FI" dirty="0" smtClean="0"/>
-              <a:t>seassa </a:t>
-            </a:r>
-            <a:endParaRPr lang="fi-FI" dirty="0" smtClean="0"/>
-          </a:p>
-          <a:p>
-            <a:r>
-              <a:rPr lang="en-US" sz="1600" strike="sngStrike" dirty="0">
-                <a:latin typeface="Courier New" panose="02070309020205020404" pitchFamily="49" charset="0"/>
-                <a:cs typeface="Courier New" panose="02070309020205020404" pitchFamily="49" charset="0"/>
-              </a:rPr>
-              <a:t>Object reference not set to an instance of an </a:t>
-            </a:r>
-            <a:r>
-              <a:rPr lang="en-US" sz="1600" strike="sngStrike" dirty="0" smtClean="0">
-                <a:latin typeface="Courier New" panose="02070309020205020404" pitchFamily="49" charset="0"/>
-                <a:cs typeface="Courier New" panose="02070309020205020404" pitchFamily="49" charset="0"/>
-              </a:rPr>
-              <a:t>object</a:t>
-            </a:r>
-            <a:r>
-              <a:rPr lang="en-US" sz="1600" dirty="0" smtClean="0">
-                <a:latin typeface="Courier New" panose="02070309020205020404" pitchFamily="49" charset="0"/>
-                <a:cs typeface="Courier New" panose="02070309020205020404" pitchFamily="49" charset="0"/>
-              </a:rPr>
-              <a:t> </a:t>
-            </a:r>
-            <a:endParaRPr lang="fi-FI" strike="sngStrike" dirty="0" smtClean="0"/>
-          </a:p>
-          <a:p>
-            <a:pPr marL="0" indent="0">
-              <a:buNone/>
-            </a:pPr>
-            <a:endParaRPr lang="fi-FI" i="1" dirty="0" smtClean="0"/>
           </a:p>
           <a:p>
             <a:pPr marL="0" indent="0">
               <a:buNone/>
             </a:pPr>
             <a:endParaRPr lang="fi-FI" dirty="0" smtClean="0"/>
+          </a:p>
+          <a:p>
+            <a:pPr marL="0" indent="0">
+              <a:buNone/>
+            </a:pPr>
+            <a:r>
+              <a:rPr lang="fi-FI" dirty="0" smtClean="0"/>
+              <a:t>???</a:t>
+            </a:r>
+            <a:endParaRPr lang="fi-FI" dirty="0" smtClean="0"/>
+          </a:p>
+          <a:p>
+            <a:pPr marL="0" indent="0">
+              <a:buNone/>
+            </a:pPr>
+            <a:endParaRPr lang="fi-FI" dirty="0" smtClean="0"/>
+          </a:p>
+          <a:p>
+            <a:endParaRPr lang="fi-FI" dirty="0"/>
           </a:p>
         </p:txBody>
       </p:sp>
     </p:spTree>
     <p:extLst>
       <p:ext uri="{BB962C8B-B14F-4D97-AF65-F5344CB8AC3E}">
-        <p14:creationId xmlns:p14="http://schemas.microsoft.com/office/powerpoint/2010/main" val="3626837686"/>
+        <p14:creationId xmlns:p14="http://schemas.microsoft.com/office/powerpoint/2010/main" val="2185046805"/>
       </p:ext>
     </p:extLst>
   </p:cSld>
@@ -4629,7 +4664,6 @@
               <a:rPr lang="fi-FI" dirty="0" smtClean="0"/>
               <a:t>Koulutus ja käytännöt</a:t>
             </a:r>
-            <a:endParaRPr lang="fi-FI" dirty="0" smtClean="0"/>
           </a:p>
           <a:p>
             <a:r>
@@ -4640,21 +4674,8 @@
           <a:p>
             <a:r>
               <a:rPr lang="fi-FI" dirty="0" smtClean="0"/>
-              <a:t>Kaikki ominaisuudet ei vielä samalla tasolla </a:t>
-            </a:r>
-            <a:r>
-              <a:rPr lang="fi-FI" dirty="0" smtClean="0"/>
-              <a:t>kuin </a:t>
-            </a:r>
-            <a:r>
-              <a:rPr lang="fi-FI" dirty="0" smtClean="0"/>
-              <a:t>C</a:t>
-            </a:r>
-            <a:r>
-              <a:rPr lang="fi-FI" dirty="0" smtClean="0"/>
-              <a:t>#</a:t>
-            </a:r>
-            <a:endParaRPr lang="fi-FI" dirty="0" smtClean="0"/>
+              <a:t>Kaikki ominaisuudet ei vielä samalla tasolla kuin C#</a:t>
+            </a:r>
           </a:p>
           <a:p>
             <a:pPr marL="0" indent="0">
@@ -4776,30 +4797,23 @@
           <a:p>
             <a:pPr lvl="1"/>
             <a:r>
+              <a:rPr lang="fi-FI" dirty="0" smtClean="0"/>
+              <a:t>Muut deklaratiiviset kielet/</a:t>
+            </a:r>
+            <a:r>
+              <a:rPr lang="fi-FI" dirty="0" err="1" smtClean="0"/>
+              <a:t>frameworkit</a:t>
+            </a:r>
+            <a:endParaRPr lang="fi-FI" dirty="0"/>
+          </a:p>
+          <a:p>
+            <a:r>
+              <a:rPr lang="fi-FI" dirty="0" smtClean="0"/>
+              <a:t>Uusi </a:t>
+            </a:r>
+            <a:r>
               <a:rPr lang="fi-FI" dirty="0"/>
-              <a:t>SQL</a:t>
-            </a:r>
-          </a:p>
-          <a:p>
-            <a:pPr lvl="1"/>
-            <a:r>
-              <a:rPr lang="fi-FI" dirty="0" smtClean="0"/>
-              <a:t>Uudet </a:t>
-            </a:r>
-            <a:r>
-              <a:rPr lang="fi-FI" dirty="0" err="1" smtClean="0"/>
-              <a:t>Javascript</a:t>
-            </a:r>
-            <a:r>
-              <a:rPr lang="fi-FI" dirty="0" smtClean="0"/>
-              <a:t> ominaisuudet/kirjastot</a:t>
-            </a:r>
-            <a:endParaRPr lang="fi-FI" dirty="0"/>
-          </a:p>
-          <a:p>
-            <a:r>
-              <a:rPr lang="fi-FI" dirty="0"/>
-              <a:t>Uusi työkalu </a:t>
+              <a:t>työkalu </a:t>
             </a:r>
             <a:r>
               <a:rPr lang="fi-FI" dirty="0" smtClean="0"/>

</xml_diff>

<commit_message>
Record type example and pattern match with it
</commit_message>
<xml_diff>
--- a/F.pptx
+++ b/F.pptx
@@ -346,7 +346,7 @@
             <a:fld id="{5586B75A-687E-405C-8A0B-8D00578BA2C3}" type="datetimeFigureOut">
               <a:rPr lang="en-US" dirty="0"/>
               <a:pPr/>
-              <a:t>3/5/2018</a:t>
+              <a:t>3/6/2018</a:t>
             </a:fld>
             <a:endParaRPr lang="en-US" dirty="0"/>
           </a:p>
@@ -513,7 +513,7 @@
             <a:fld id="{5586B75A-687E-405C-8A0B-8D00578BA2C3}" type="datetimeFigureOut">
               <a:rPr lang="en-US" dirty="0"/>
               <a:pPr/>
-              <a:t>3/5/2018</a:t>
+              <a:t>3/6/2018</a:t>
             </a:fld>
             <a:endParaRPr lang="en-US" dirty="0"/>
           </a:p>
@@ -690,7 +690,7 @@
             <a:fld id="{5586B75A-687E-405C-8A0B-8D00578BA2C3}" type="datetimeFigureOut">
               <a:rPr lang="en-US" dirty="0"/>
               <a:pPr/>
-              <a:t>3/5/2018</a:t>
+              <a:t>3/6/2018</a:t>
             </a:fld>
             <a:endParaRPr lang="en-US" dirty="0"/>
           </a:p>
@@ -857,7 +857,7 @@
             <a:fld id="{5586B75A-687E-405C-8A0B-8D00578BA2C3}" type="datetimeFigureOut">
               <a:rPr lang="en-US" dirty="0"/>
               <a:pPr/>
-              <a:t>3/5/2018</a:t>
+              <a:t>3/6/2018</a:t>
             </a:fld>
             <a:endParaRPr lang="en-US" dirty="0"/>
           </a:p>
@@ -1112,7 +1112,7 @@
             <a:fld id="{5586B75A-687E-405C-8A0B-8D00578BA2C3}" type="datetimeFigureOut">
               <a:rPr lang="en-US" dirty="0"/>
               <a:pPr/>
-              <a:t>3/5/2018</a:t>
+              <a:t>3/6/2018</a:t>
             </a:fld>
             <a:endParaRPr lang="en-US" dirty="0"/>
           </a:p>
@@ -1397,7 +1397,7 @@
             <a:fld id="{5586B75A-687E-405C-8A0B-8D00578BA2C3}" type="datetimeFigureOut">
               <a:rPr lang="en-US" dirty="0"/>
               <a:pPr/>
-              <a:t>3/5/2018</a:t>
+              <a:t>3/6/2018</a:t>
             </a:fld>
             <a:endParaRPr lang="en-US" dirty="0"/>
           </a:p>
@@ -1836,7 +1836,7 @@
             <a:fld id="{5586B75A-687E-405C-8A0B-8D00578BA2C3}" type="datetimeFigureOut">
               <a:rPr lang="en-US" dirty="0"/>
               <a:pPr/>
-              <a:t>3/5/2018</a:t>
+              <a:t>3/6/2018</a:t>
             </a:fld>
             <a:endParaRPr lang="en-US" dirty="0"/>
           </a:p>
@@ -1951,7 +1951,7 @@
             <a:fld id="{5586B75A-687E-405C-8A0B-8D00578BA2C3}" type="datetimeFigureOut">
               <a:rPr lang="en-US" dirty="0"/>
               <a:pPr/>
-              <a:t>3/5/2018</a:t>
+              <a:t>3/6/2018</a:t>
             </a:fld>
             <a:endParaRPr lang="en-US" dirty="0"/>
           </a:p>
@@ -2043,7 +2043,7 @@
             <a:fld id="{5586B75A-687E-405C-8A0B-8D00578BA2C3}" type="datetimeFigureOut">
               <a:rPr lang="en-US" dirty="0"/>
               <a:pPr/>
-              <a:t>3/5/2018</a:t>
+              <a:t>3/6/2018</a:t>
             </a:fld>
             <a:endParaRPr lang="en-US" dirty="0"/>
           </a:p>
@@ -2328,7 +2328,7 @@
             <a:fld id="{5586B75A-687E-405C-8A0B-8D00578BA2C3}" type="datetimeFigureOut">
               <a:rPr lang="en-US" dirty="0"/>
               <a:pPr/>
-              <a:t>3/5/2018</a:t>
+              <a:t>3/6/2018</a:t>
             </a:fld>
             <a:endParaRPr lang="en-US" dirty="0"/>
           </a:p>
@@ -2598,7 +2598,7 @@
             <a:fld id="{5586B75A-687E-405C-8A0B-8D00578BA2C3}" type="datetimeFigureOut">
               <a:rPr lang="en-US" dirty="0"/>
               <a:pPr/>
-              <a:t>3/5/2018</a:t>
+              <a:t>3/6/2018</a:t>
             </a:fld>
             <a:endParaRPr lang="en-US" dirty="0"/>
           </a:p>
@@ -2892,7 +2892,7 @@
             <a:fld id="{5586B75A-687E-405C-8A0B-8D00578BA2C3}" type="datetimeFigureOut">
               <a:rPr lang="en-US" dirty="0"/>
               <a:pPr/>
-              <a:t>3/5/2018</a:t>
+              <a:t>3/6/2018</a:t>
             </a:fld>
             <a:endParaRPr lang="en-US" dirty="0"/>
           </a:p>
@@ -3732,7 +3732,6 @@
               <a:rPr lang="fi-FI" dirty="0" smtClean="0"/>
               <a:t>Tutut ympäristöt ja kirjastot</a:t>
             </a:r>
-            <a:endParaRPr lang="fi-FI" dirty="0" smtClean="0"/>
           </a:p>
           <a:p>
             <a:pPr lvl="1"/>
@@ -4283,8 +4282,13 @@
             </a:r>
             <a:r>
               <a:rPr lang="fi-FI" b="1" dirty="0" smtClean="0"/>
-              <a:t> POV</a:t>
-            </a:r>
+              <a:t> </a:t>
+            </a:r>
+            <a:r>
+              <a:rPr lang="fi-FI" b="1" dirty="0" smtClean="0"/>
+              <a:t>POV</a:t>
+            </a:r>
+            <a:endParaRPr lang="fi-FI" b="1" dirty="0" smtClean="0"/>
           </a:p>
           <a:p>
             <a:r>
@@ -4506,11 +4510,7 @@
           <a:p>
             <a:r>
               <a:rPr lang="fi-FI" dirty="0" smtClean="0"/>
-              <a:t>Voi vähentää </a:t>
-            </a:r>
-            <a:r>
-              <a:rPr lang="fi-FI" dirty="0" smtClean="0"/>
-              <a:t>virheitä ja </a:t>
+              <a:t>Voi vähentää virheitä ja </a:t>
             </a:r>
             <a:r>
               <a:rPr lang="fi-FI" dirty="0" err="1" smtClean="0"/>
@@ -4518,24 +4518,14 @@
             </a:r>
             <a:r>
               <a:rPr lang="fi-FI" dirty="0" smtClean="0"/>
-              <a:t> </a:t>
-            </a:r>
-            <a:r>
-              <a:rPr lang="fi-FI" dirty="0" smtClean="0"/>
-              <a:t>jotka pääsevät releaseen</a:t>
-            </a:r>
-            <a:endParaRPr lang="fi-FI" dirty="0" smtClean="0"/>
-          </a:p>
-          <a:p>
-            <a:r>
-              <a:rPr lang="fi-FI" dirty="0" smtClean="0"/>
-              <a:t>Voi parantaa </a:t>
-            </a:r>
-            <a:r>
-              <a:rPr lang="fi-FI" dirty="0" smtClean="0"/>
-              <a:t>tuottavuutta</a:t>
-            </a:r>
-            <a:endParaRPr lang="fi-FI" dirty="0" smtClean="0"/>
+              <a:t> jotka pääsevät releaseen</a:t>
+            </a:r>
+          </a:p>
+          <a:p>
+            <a:r>
+              <a:rPr lang="fi-FI" dirty="0" smtClean="0"/>
+              <a:t>Voi parantaa tuottavuutta</a:t>
+            </a:r>
           </a:p>
           <a:p>
             <a:pPr marL="0" indent="0">
@@ -4551,7 +4541,6 @@
               <a:rPr lang="fi-FI" dirty="0" smtClean="0"/>
               <a:t>???</a:t>
             </a:r>
-            <a:endParaRPr lang="fi-FI" dirty="0" smtClean="0"/>
           </a:p>
           <a:p>
             <a:pPr marL="0" indent="0">

</xml_diff>

<commit_message>
Added interop example for F# types in C#
</commit_message>
<xml_diff>
--- a/F.pptx
+++ b/F.pptx
@@ -10,8 +10,8 @@
     <p:sldId id="259" r:id="rId4"/>
     <p:sldId id="260" r:id="rId5"/>
     <p:sldId id="265" r:id="rId6"/>
-    <p:sldId id="261" r:id="rId7"/>
-    <p:sldId id="258" r:id="rId8"/>
+    <p:sldId id="258" r:id="rId7"/>
+    <p:sldId id="261" r:id="rId8"/>
     <p:sldId id="262" r:id="rId9"/>
     <p:sldId id="264" r:id="rId10"/>
     <p:sldId id="263" r:id="rId11"/>
@@ -4245,7 +4245,12 @@
             <p:ph type="title"/>
           </p:nvPr>
         </p:nvSpPr>
-        <p:spPr/>
+        <p:spPr>
+          <a:xfrm>
+            <a:off x="277633" y="1123836"/>
+            <a:ext cx="2947482" cy="4601183"/>
+          </a:xfrm>
+        </p:spPr>
         <p:txBody>
           <a:bodyPr/>
           <a:lstStyle/>
@@ -4276,135 +4281,94 @@
             <a:pPr marL="0" indent="0">
               <a:buNone/>
             </a:pPr>
-            <a:r>
-              <a:rPr lang="fi-FI" b="1" dirty="0" err="1" smtClean="0"/>
-              <a:t>Koodari</a:t>
-            </a:r>
+            <a:endParaRPr lang="fi-FI" b="1" dirty="0" smtClean="0"/>
+          </a:p>
+          <a:p>
+            <a:pPr marL="0" indent="0">
+              <a:buNone/>
+            </a:pPr>
+            <a:endParaRPr lang="fi-FI" b="1" dirty="0"/>
+          </a:p>
+          <a:p>
+            <a:pPr marL="0" indent="0">
+              <a:buNone/>
+            </a:pPr>
+            <a:endParaRPr lang="fi-FI" b="1" dirty="0" smtClean="0"/>
+          </a:p>
+          <a:p>
+            <a:pPr marL="0" indent="0">
+              <a:buNone/>
+            </a:pPr>
             <a:r>
               <a:rPr lang="fi-FI" b="1" dirty="0" smtClean="0"/>
-              <a:t> </a:t>
-            </a:r>
-            <a:r>
-              <a:rPr lang="fi-FI" b="1" dirty="0" smtClean="0"/>
-              <a:t>POV</a:t>
-            </a:r>
-            <a:endParaRPr lang="fi-FI" b="1" dirty="0" smtClean="0"/>
-          </a:p>
-          <a:p>
-            <a:r>
-              <a:rPr lang="fi-FI" dirty="0" smtClean="0"/>
-              <a:t>Funktiot</a:t>
-            </a:r>
-          </a:p>
-          <a:p>
-            <a:r>
-              <a:rPr lang="fi-FI" dirty="0" smtClean="0"/>
-              <a:t>Tyypit</a:t>
-            </a:r>
-          </a:p>
-          <a:p>
-            <a:r>
-              <a:rPr lang="fi-FI" dirty="0" smtClean="0"/>
-              <a:t>C# </a:t>
+              <a:t>Liiketoiminta POV</a:t>
+            </a:r>
+          </a:p>
+          <a:p>
+            <a:r>
+              <a:rPr lang="fi-FI" dirty="0" smtClean="0"/>
+              <a:t>Asiakas/case voi vaatia</a:t>
+            </a:r>
+            <a:endParaRPr lang="fi-FI" dirty="0"/>
+          </a:p>
+          <a:p>
+            <a:r>
+              <a:rPr lang="fi-FI" b="1" i="1" dirty="0" smtClean="0"/>
+              <a:t>Voi</a:t>
+            </a:r>
+            <a:r>
+              <a:rPr lang="fi-FI" dirty="0" smtClean="0"/>
+              <a:t> vähentää virheitä ja </a:t>
             </a:r>
             <a:r>
               <a:rPr lang="fi-FI" dirty="0" err="1" smtClean="0"/>
-              <a:t>Interop</a:t>
-            </a:r>
-            <a:endParaRPr lang="fi-FI" dirty="0" smtClean="0"/>
-          </a:p>
-          <a:p>
-            <a:r>
-              <a:rPr lang="fi-FI" dirty="0" err="1" smtClean="0"/>
-              <a:t>Async</a:t>
-            </a:r>
-            <a:r>
-              <a:rPr lang="fi-FI" dirty="0" smtClean="0"/>
-              <a:t> </a:t>
-            </a:r>
-            <a:r>
-              <a:rPr lang="fi-FI" dirty="0"/>
-              <a:t>/ </a:t>
-            </a:r>
-            <a:r>
-              <a:rPr lang="fi-FI" dirty="0" err="1" smtClean="0"/>
-              <a:t>Parallel</a:t>
-            </a:r>
-            <a:endParaRPr lang="fi-FI" dirty="0" smtClean="0"/>
-          </a:p>
-          <a:p>
-            <a:r>
-              <a:rPr lang="fi-FI" dirty="0" err="1" smtClean="0"/>
-              <a:t>NuGet</a:t>
-            </a:r>
-            <a:endParaRPr lang="fi-FI" dirty="0" smtClean="0"/>
-          </a:p>
-          <a:p>
-            <a:r>
-              <a:rPr lang="fi-FI" dirty="0" err="1" smtClean="0"/>
-              <a:t>Compiled</a:t>
-            </a:r>
-            <a:r>
-              <a:rPr lang="fi-FI" dirty="0" smtClean="0"/>
-              <a:t> tai Interactive</a:t>
-            </a:r>
-          </a:p>
-          <a:p>
-            <a:r>
-              <a:rPr lang="fi-FI" dirty="0" smtClean="0"/>
-              <a:t>Ei </a:t>
-            </a:r>
-            <a:r>
-              <a:rPr lang="fi-FI" dirty="0"/>
-              <a:t>{;} </a:t>
-            </a:r>
-            <a:r>
-              <a:rPr lang="fi-FI" dirty="0" smtClean="0"/>
-              <a:t>höttöä koodin seassa </a:t>
-            </a:r>
-          </a:p>
-          <a:p>
-            <a:r>
-              <a:rPr lang="en-US" sz="1600" strike="sngStrike" dirty="0">
-                <a:latin typeface="Courier New" panose="02070309020205020404" pitchFamily="49" charset="0"/>
-                <a:cs typeface="Courier New" panose="02070309020205020404" pitchFamily="49" charset="0"/>
-              </a:rPr>
-              <a:t>Object reference not set to an instance of an </a:t>
-            </a:r>
-            <a:r>
-              <a:rPr lang="en-US" sz="1600" strike="sngStrike" dirty="0" smtClean="0">
-                <a:latin typeface="Courier New" panose="02070309020205020404" pitchFamily="49" charset="0"/>
-                <a:cs typeface="Courier New" panose="02070309020205020404" pitchFamily="49" charset="0"/>
-              </a:rPr>
-              <a:t>object</a:t>
-            </a:r>
-            <a:r>
-              <a:rPr lang="en-US" sz="1600" dirty="0" smtClean="0">
-                <a:latin typeface="Courier New" panose="02070309020205020404" pitchFamily="49" charset="0"/>
-                <a:cs typeface="Courier New" panose="02070309020205020404" pitchFamily="49" charset="0"/>
-              </a:rPr>
-              <a:t> </a:t>
-            </a:r>
-            <a:endParaRPr lang="fi-FI" strike="sngStrike" dirty="0" smtClean="0"/>
-          </a:p>
-          <a:p>
-            <a:pPr marL="0" indent="0">
-              <a:buNone/>
-            </a:pPr>
-            <a:endParaRPr lang="fi-FI" i="1" dirty="0" smtClean="0"/>
+              <a:t>bugeja</a:t>
+            </a:r>
+            <a:r>
+              <a:rPr lang="fi-FI" dirty="0" smtClean="0"/>
+              <a:t> jotka pääsevät releaseen</a:t>
+            </a:r>
+          </a:p>
+          <a:p>
+            <a:r>
+              <a:rPr lang="fi-FI" b="1" i="1" dirty="0" smtClean="0"/>
+              <a:t>Voi</a:t>
+            </a:r>
+            <a:r>
+              <a:rPr lang="fi-FI" dirty="0" smtClean="0"/>
+              <a:t> parantaa tuottavuutta</a:t>
+            </a:r>
           </a:p>
           <a:p>
             <a:pPr marL="0" indent="0">
               <a:buNone/>
             </a:pPr>
             <a:endParaRPr lang="fi-FI" dirty="0" smtClean="0"/>
+          </a:p>
+          <a:p>
+            <a:pPr marL="0" indent="0">
+              <a:buNone/>
+            </a:pPr>
+            <a:r>
+              <a:rPr lang="fi-FI" dirty="0" smtClean="0"/>
+              <a:t>???</a:t>
+            </a:r>
+          </a:p>
+          <a:p>
+            <a:pPr marL="0" indent="0">
+              <a:buNone/>
+            </a:pPr>
+            <a:endParaRPr lang="fi-FI" dirty="0" smtClean="0"/>
+          </a:p>
+          <a:p>
+            <a:endParaRPr lang="fi-FI" dirty="0"/>
           </a:p>
         </p:txBody>
       </p:sp>
     </p:spTree>
     <p:extLst>
       <p:ext uri="{BB962C8B-B14F-4D97-AF65-F5344CB8AC3E}">
-        <p14:creationId xmlns:p14="http://schemas.microsoft.com/office/powerpoint/2010/main" val="3626837686"/>
+        <p14:creationId xmlns:p14="http://schemas.microsoft.com/office/powerpoint/2010/main" val="2185046805"/>
       </p:ext>
     </p:extLst>
   </p:cSld>
@@ -4448,12 +4412,7 @@
             <p:ph type="title"/>
           </p:nvPr>
         </p:nvSpPr>
-        <p:spPr>
-          <a:xfrm>
-            <a:off x="277633" y="1123836"/>
-            <a:ext cx="2947482" cy="4601183"/>
-          </a:xfrm>
-        </p:spPr>
+        <p:spPr/>
         <p:txBody>
           <a:bodyPr/>
           <a:lstStyle/>
@@ -4484,79 +4443,130 @@
             <a:pPr marL="0" indent="0">
               <a:buNone/>
             </a:pPr>
-            <a:endParaRPr lang="fi-FI" b="1" dirty="0" smtClean="0"/>
+            <a:r>
+              <a:rPr lang="fi-FI" b="1" dirty="0" err="1" smtClean="0"/>
+              <a:t>Koodari</a:t>
+            </a:r>
+            <a:r>
+              <a:rPr lang="fi-FI" b="1" dirty="0" smtClean="0"/>
+              <a:t> POV</a:t>
+            </a:r>
+          </a:p>
+          <a:p>
+            <a:r>
+              <a:rPr lang="fi-FI" dirty="0" smtClean="0"/>
+              <a:t>Funktiot</a:t>
+            </a:r>
+          </a:p>
+          <a:p>
+            <a:r>
+              <a:rPr lang="fi-FI" dirty="0" smtClean="0"/>
+              <a:t>Tyypit</a:t>
+            </a:r>
+          </a:p>
+          <a:p>
+            <a:r>
+              <a:rPr lang="fi-FI" dirty="0" smtClean="0"/>
+              <a:t>C# </a:t>
+            </a:r>
+            <a:r>
+              <a:rPr lang="fi-FI" dirty="0" err="1" smtClean="0"/>
+              <a:t>Interop</a:t>
+            </a:r>
+            <a:endParaRPr lang="fi-FI" dirty="0" smtClean="0"/>
+          </a:p>
+          <a:p>
+            <a:r>
+              <a:rPr lang="fi-FI" dirty="0" err="1" smtClean="0"/>
+              <a:t>Async</a:t>
+            </a:r>
+            <a:r>
+              <a:rPr lang="fi-FI" dirty="0" smtClean="0"/>
+              <a:t> </a:t>
+            </a:r>
+            <a:r>
+              <a:rPr lang="fi-FI" dirty="0"/>
+              <a:t>/ </a:t>
+            </a:r>
+            <a:r>
+              <a:rPr lang="fi-FI" dirty="0" err="1" smtClean="0"/>
+              <a:t>Parallel</a:t>
+            </a:r>
+            <a:endParaRPr lang="fi-FI" dirty="0" smtClean="0"/>
+          </a:p>
+          <a:p>
+            <a:r>
+              <a:rPr lang="fi-FI" dirty="0" err="1" smtClean="0"/>
+              <a:t>NuGet</a:t>
+            </a:r>
+            <a:endParaRPr lang="fi-FI" dirty="0" smtClean="0"/>
+          </a:p>
+          <a:p>
+            <a:r>
+              <a:rPr lang="fi-FI" dirty="0" err="1" smtClean="0"/>
+              <a:t>Compiled</a:t>
+            </a:r>
+            <a:r>
+              <a:rPr lang="fi-FI" dirty="0" smtClean="0"/>
+              <a:t> tai Interactive</a:t>
+            </a:r>
+          </a:p>
+          <a:p>
+            <a:r>
+              <a:rPr lang="fi-FI" dirty="0" smtClean="0"/>
+              <a:t>Ei </a:t>
+            </a:r>
+            <a:r>
+              <a:rPr lang="fi-FI" dirty="0"/>
+              <a:t>{;} </a:t>
+            </a:r>
+            <a:r>
+              <a:rPr lang="fi-FI" dirty="0" smtClean="0"/>
+              <a:t>höttöä koodin seassa </a:t>
+            </a:r>
+          </a:p>
+          <a:p>
+            <a:r>
+              <a:rPr lang="en-US" sz="1600" strike="sngStrike" dirty="0">
+                <a:latin typeface="Courier New" panose="02070309020205020404" pitchFamily="49" charset="0"/>
+                <a:cs typeface="Courier New" panose="02070309020205020404" pitchFamily="49" charset="0"/>
+              </a:rPr>
+              <a:t>Object reference not set to an instance of an </a:t>
+            </a:r>
+            <a:r>
+              <a:rPr lang="en-US" sz="1600" strike="sngStrike" dirty="0" smtClean="0">
+                <a:latin typeface="Courier New" panose="02070309020205020404" pitchFamily="49" charset="0"/>
+                <a:cs typeface="Courier New" panose="02070309020205020404" pitchFamily="49" charset="0"/>
+              </a:rPr>
+              <a:t>object</a:t>
+            </a:r>
+            <a:r>
+              <a:rPr lang="en-US" sz="1600" dirty="0" smtClean="0">
+                <a:latin typeface="Courier New" panose="02070309020205020404" pitchFamily="49" charset="0"/>
+                <a:cs typeface="Courier New" panose="02070309020205020404" pitchFamily="49" charset="0"/>
+              </a:rPr>
+              <a:t> </a:t>
+            </a:r>
+            <a:endParaRPr lang="fi-FI" strike="sngStrike" dirty="0" smtClean="0"/>
           </a:p>
           <a:p>
             <a:pPr marL="0" indent="0">
               <a:buNone/>
             </a:pPr>
-            <a:endParaRPr lang="fi-FI" b="1" dirty="0"/>
-          </a:p>
-          <a:p>
-            <a:pPr marL="0" indent="0">
-              <a:buNone/>
-            </a:pPr>
-            <a:endParaRPr lang="fi-FI" b="1" dirty="0" smtClean="0"/>
-          </a:p>
-          <a:p>
-            <a:pPr marL="0" indent="0">
-              <a:buNone/>
-            </a:pPr>
-            <a:r>
-              <a:rPr lang="fi-FI" b="1" dirty="0" smtClean="0"/>
-              <a:t>Liiketoiminta POV</a:t>
-            </a:r>
-          </a:p>
-          <a:p>
-            <a:r>
-              <a:rPr lang="fi-FI" dirty="0" smtClean="0"/>
-              <a:t>Voi vähentää virheitä ja </a:t>
-            </a:r>
-            <a:r>
-              <a:rPr lang="fi-FI" dirty="0" err="1" smtClean="0"/>
-              <a:t>bugeja</a:t>
-            </a:r>
-            <a:r>
-              <a:rPr lang="fi-FI" dirty="0" smtClean="0"/>
-              <a:t> jotka pääsevät releaseen</a:t>
-            </a:r>
-          </a:p>
-          <a:p>
-            <a:r>
-              <a:rPr lang="fi-FI" dirty="0" smtClean="0"/>
-              <a:t>Voi parantaa tuottavuutta</a:t>
-            </a:r>
+            <a:endParaRPr lang="fi-FI" i="1" dirty="0" smtClean="0"/>
           </a:p>
           <a:p>
             <a:pPr marL="0" indent="0">
               <a:buNone/>
             </a:pPr>
             <a:endParaRPr lang="fi-FI" dirty="0" smtClean="0"/>
-          </a:p>
-          <a:p>
-            <a:pPr marL="0" indent="0">
-              <a:buNone/>
-            </a:pPr>
-            <a:r>
-              <a:rPr lang="fi-FI" dirty="0" smtClean="0"/>
-              <a:t>???</a:t>
-            </a:r>
-          </a:p>
-          <a:p>
-            <a:pPr marL="0" indent="0">
-              <a:buNone/>
-            </a:pPr>
-            <a:endParaRPr lang="fi-FI" dirty="0" smtClean="0"/>
-          </a:p>
-          <a:p>
-            <a:endParaRPr lang="fi-FI" dirty="0"/>
           </a:p>
         </p:txBody>
       </p:sp>
     </p:spTree>
     <p:extLst>
       <p:ext uri="{BB962C8B-B14F-4D97-AF65-F5344CB8AC3E}">
-        <p14:creationId xmlns:p14="http://schemas.microsoft.com/office/powerpoint/2010/main" val="2185046805"/>
+        <p14:creationId xmlns:p14="http://schemas.microsoft.com/office/powerpoint/2010/main" val="3626837686"/>
       </p:ext>
     </p:extLst>
   </p:cSld>
@@ -4663,7 +4673,15 @@
           <a:p>
             <a:r>
               <a:rPr lang="fi-FI" dirty="0" smtClean="0"/>
-              <a:t>Kaikki ominaisuudet ei vielä samalla tasolla kuin C#</a:t>
+              <a:t>Kaikki </a:t>
+            </a:r>
+            <a:r>
+              <a:rPr lang="fi-FI" dirty="0" smtClean="0"/>
+              <a:t>ominaisuudet </a:t>
+            </a:r>
+            <a:r>
+              <a:rPr lang="fi-FI" dirty="0" smtClean="0"/>
+              <a:t>ei vielä samalla tasolla kuin C#</a:t>
             </a:r>
           </a:p>
           <a:p>

</xml_diff>